<commit_message>
add ppt for final presentation
</commit_message>
<xml_diff>
--- a/ai_final_project_mastermind.pptx
+++ b/ai_final_project_mastermind.pptx
@@ -5,7 +5,7 @@
     <p:sldMasterId id="2147483660" r:id="rId1"/>
   </p:sldMasterIdLst>
   <p:notesMasterIdLst>
-    <p:notesMasterId r:id="rId12"/>
+    <p:notesMasterId r:id="rId14"/>
   </p:notesMasterIdLst>
   <p:sldIdLst>
     <p:sldId id="256" r:id="rId2"/>
@@ -14,10 +14,12 @@
     <p:sldId id="257" r:id="rId5"/>
     <p:sldId id="258" r:id="rId6"/>
     <p:sldId id="263" r:id="rId7"/>
-    <p:sldId id="264" r:id="rId8"/>
-    <p:sldId id="265" r:id="rId9"/>
-    <p:sldId id="266" r:id="rId10"/>
-    <p:sldId id="267" r:id="rId11"/>
+    <p:sldId id="268" r:id="rId8"/>
+    <p:sldId id="270" r:id="rId9"/>
+    <p:sldId id="269" r:id="rId10"/>
+    <p:sldId id="264" r:id="rId11"/>
+    <p:sldId id="266" r:id="rId12"/>
+    <p:sldId id="267" r:id="rId13"/>
   </p:sldIdLst>
   <p:sldSz cx="12192000" cy="6858000"/>
   <p:notesSz cx="6858000" cy="9144000"/>
@@ -7651,6 +7653,459 @@
           <a:p>
             <a:r>
               <a:rPr lang="en-US" dirty="0"/>
+              <a:t>                 Knuth   Policy</a:t>
+            </a:r>
+            <a:endParaRPr lang="en-US" sz="4000" dirty="0"/>
+          </a:p>
+        </p:txBody>
+      </p:sp>
+      <p:sp>
+        <p:nvSpPr>
+          <p:cNvPr id="3" name="Rectangle 2">
+            <a:extLst>
+              <a:ext uri="{FF2B5EF4-FFF2-40B4-BE49-F238E27FC236}">
+                <a16:creationId xmlns:a16="http://schemas.microsoft.com/office/drawing/2014/main" id="{F96CC5E6-C228-43AA-8E68-B86504191A81}"/>
+              </a:ext>
+            </a:extLst>
+          </p:cNvPr>
+          <p:cNvSpPr/>
+          <p:nvPr/>
+        </p:nvSpPr>
+        <p:spPr>
+          <a:xfrm>
+            <a:off x="320186" y="724048"/>
+            <a:ext cx="9404722" cy="5909310"/>
+          </a:xfrm>
+          <a:prstGeom prst="rect">
+            <a:avLst/>
+          </a:prstGeom>
+        </p:spPr>
+        <p:txBody>
+          <a:bodyPr wrap="square">
+            <a:spAutoFit/>
+          </a:bodyPr>
+          <a:lstStyle/>
+          <a:p>
+            <a:pPr marL="342900" indent="-342900">
+              <a:buAutoNum type="arabicParenR"/>
+            </a:pPr>
+            <a:r>
+              <a:rPr lang="en-US" dirty="0"/>
+              <a:t>Assign a score to each possible guess based on the worst-case  scoring algorithm – see below</a:t>
+            </a:r>
+          </a:p>
+          <a:p>
+            <a:pPr marL="342900" indent="-342900">
+              <a:buAutoNum type="arabicParenR"/>
+            </a:pPr>
+            <a:r>
+              <a:rPr lang="en-US" dirty="0"/>
+              <a:t>Pick the guess with the best (lowest score)score. In case of a tie prefer a guess from the qualifying candidates   </a:t>
+            </a:r>
+          </a:p>
+          <a:p>
+            <a:pPr marL="342900" indent="-342900">
+              <a:buAutoNum type="arabicParenR"/>
+            </a:pPr>
+            <a:r>
+              <a:rPr lang="en-US" dirty="0"/>
+              <a:t>If winning guess  quit  </a:t>
+            </a:r>
+          </a:p>
+          <a:p>
+            <a:r>
+              <a:rPr lang="en-US" dirty="0"/>
+              <a:t>2)  Based on the response ,filters out the list candidate</a:t>
+            </a:r>
+          </a:p>
+          <a:p>
+            <a:pPr marL="342900" indent="-342900">
+              <a:buAutoNum type="arabicParenR" startAt="3"/>
+            </a:pPr>
+            <a:r>
+              <a:rPr lang="en-US" dirty="0"/>
+              <a:t>Go to 1)</a:t>
+            </a:r>
+          </a:p>
+          <a:p>
+            <a:pPr marL="342900" indent="-342900">
+              <a:buAutoNum type="arabicParenR" startAt="3"/>
+            </a:pPr>
+            <a:endParaRPr lang="en-US" dirty="0"/>
+          </a:p>
+          <a:p>
+            <a:r>
+              <a:rPr lang="en-US" b="1" u="sng" dirty="0"/>
+              <a:t>worst-case scoring algorithm</a:t>
+            </a:r>
+          </a:p>
+          <a:p>
+            <a:r>
+              <a:rPr lang="en-US" dirty="0"/>
+              <a:t>For the guess evaluated, compute all the different 15  lists of qualifying candidates ,one for each possible response, from the existing list of qualifying candidates. </a:t>
+            </a:r>
+          </a:p>
+          <a:p>
+            <a:r>
+              <a:rPr lang="en-US" dirty="0"/>
+              <a:t>The length of the longest list is the score of the guess.</a:t>
+            </a:r>
+          </a:p>
+          <a:p>
+            <a:endParaRPr lang="en-US" dirty="0"/>
+          </a:p>
+          <a:p>
+            <a:r>
+              <a:rPr lang="en-US" dirty="0"/>
+              <a:t>Building a strategy tree out of Knuth  policy takes a while but it yields right a way a good result of 4.476  guesses on average to win. Shuffling the full list of guesses  randomly and rerunning it ,capturing the best result, yields : </a:t>
+            </a:r>
+          </a:p>
+          <a:p>
+            <a:endParaRPr lang="en-US" dirty="0"/>
+          </a:p>
+          <a:p>
+            <a:endParaRPr lang="en-US" dirty="0"/>
+          </a:p>
+          <a:p>
+            <a:r>
+              <a:rPr lang="en-US" dirty="0"/>
+              <a:t>                      TODO – Run Knuth in  a loop and capture results </a:t>
+            </a:r>
+          </a:p>
+          <a:p>
+            <a:endParaRPr lang="en-US" dirty="0"/>
+          </a:p>
+          <a:p>
+            <a:endParaRPr lang="en-US" dirty="0"/>
+          </a:p>
+        </p:txBody>
+      </p:sp>
+    </p:spTree>
+    <p:extLst>
+      <p:ext uri="{BB962C8B-B14F-4D97-AF65-F5344CB8AC3E}">
+        <p14:creationId xmlns:p14="http://schemas.microsoft.com/office/powerpoint/2010/main" val="3340501789"/>
+      </p:ext>
+    </p:extLst>
+  </p:cSld>
+  <p:clrMapOvr>
+    <a:masterClrMapping/>
+  </p:clrMapOvr>
+</p:sld>
+</file>
+
+<file path=ppt/slides/slide11.xml><?xml version="1.0" encoding="utf-8"?>
+<p:sld xmlns:a="http://schemas.openxmlformats.org/drawingml/2006/main" xmlns:r="http://schemas.openxmlformats.org/officeDocument/2006/relationships" xmlns:p="http://schemas.openxmlformats.org/presentationml/2006/main">
+  <p:cSld>
+    <p:spTree>
+      <p:nvGrpSpPr>
+        <p:cNvPr id="1" name=""/>
+        <p:cNvGrpSpPr/>
+        <p:nvPr/>
+      </p:nvGrpSpPr>
+      <p:grpSpPr>
+        <a:xfrm>
+          <a:off x="0" y="0"/>
+          <a:ext cx="0" cy="0"/>
+          <a:chOff x="0" y="0"/>
+          <a:chExt cx="0" cy="0"/>
+        </a:xfrm>
+      </p:grpSpPr>
+      <p:sp>
+        <p:nvSpPr>
+          <p:cNvPr id="2" name="Title 1">
+            <a:extLst>
+              <a:ext uri="{FF2B5EF4-FFF2-40B4-BE49-F238E27FC236}">
+                <a16:creationId xmlns:a16="http://schemas.microsoft.com/office/drawing/2014/main" id="{BFE03E1E-1CD4-4BF6-8AB2-07362D59237F}"/>
+              </a:ext>
+            </a:extLst>
+          </p:cNvPr>
+          <p:cNvSpPr>
+            <a:spLocks noGrp="1"/>
+          </p:cNvSpPr>
+          <p:nvPr>
+            <p:ph type="title"/>
+          </p:nvPr>
+        </p:nvSpPr>
+        <p:spPr/>
+        <p:txBody>
+          <a:bodyPr/>
+          <a:lstStyle/>
+          <a:p>
+            <a:r>
+              <a:rPr lang="en-US" dirty="0"/>
+              <a:t>         </a:t>
+            </a:r>
+          </a:p>
+        </p:txBody>
+      </p:sp>
+      <p:sp>
+        <p:nvSpPr>
+          <p:cNvPr id="6" name="Title 1">
+            <a:extLst>
+              <a:ext uri="{FF2B5EF4-FFF2-40B4-BE49-F238E27FC236}">
+                <a16:creationId xmlns:a16="http://schemas.microsoft.com/office/drawing/2014/main" id="{28909404-97CF-447C-9C07-862F156F11DD}"/>
+              </a:ext>
+            </a:extLst>
+          </p:cNvPr>
+          <p:cNvSpPr txBox="1">
+            <a:spLocks/>
+          </p:cNvSpPr>
+          <p:nvPr/>
+        </p:nvSpPr>
+        <p:spPr>
+          <a:xfrm>
+            <a:off x="194345" y="94478"/>
+            <a:ext cx="10551952" cy="1675599"/>
+          </a:xfrm>
+          <a:prstGeom prst="rect">
+            <a:avLst/>
+          </a:prstGeom>
+        </p:spPr>
+        <p:txBody>
+          <a:bodyPr vert="horz" lIns="91440" tIns="45720" rIns="91440" bIns="45720" rtlCol="0" anchor="t">
+            <a:noAutofit/>
+          </a:bodyPr>
+          <a:lstStyle>
+            <a:lvl1pPr algn="l" defTabSz="457200" rtl="0" eaLnBrk="1" latinLnBrk="0" hangingPunct="1">
+              <a:spcBef>
+                <a:spcPct val="0"/>
+              </a:spcBef>
+              <a:buNone/>
+              <a:defRPr sz="4200" b="0" i="0" kern="1200">
+                <a:solidFill>
+                  <a:schemeClr val="tx2"/>
+                </a:solidFill>
+                <a:latin typeface="+mj-lt"/>
+                <a:ea typeface="+mj-ea"/>
+                <a:cs typeface="+mj-cs"/>
+              </a:defRPr>
+            </a:lvl1pPr>
+            <a:lvl2pPr eaLnBrk="1" hangingPunct="1">
+              <a:defRPr>
+                <a:solidFill>
+                  <a:schemeClr val="tx2"/>
+                </a:solidFill>
+              </a:defRPr>
+            </a:lvl2pPr>
+            <a:lvl3pPr eaLnBrk="1" hangingPunct="1">
+              <a:defRPr>
+                <a:solidFill>
+                  <a:schemeClr val="tx2"/>
+                </a:solidFill>
+              </a:defRPr>
+            </a:lvl3pPr>
+            <a:lvl4pPr eaLnBrk="1" hangingPunct="1">
+              <a:defRPr>
+                <a:solidFill>
+                  <a:schemeClr val="tx2"/>
+                </a:solidFill>
+              </a:defRPr>
+            </a:lvl4pPr>
+            <a:lvl5pPr eaLnBrk="1" hangingPunct="1">
+              <a:defRPr>
+                <a:solidFill>
+                  <a:schemeClr val="tx2"/>
+                </a:solidFill>
+              </a:defRPr>
+            </a:lvl5pPr>
+            <a:lvl6pPr eaLnBrk="1" hangingPunct="1">
+              <a:defRPr>
+                <a:solidFill>
+                  <a:schemeClr val="tx2"/>
+                </a:solidFill>
+              </a:defRPr>
+            </a:lvl6pPr>
+            <a:lvl7pPr eaLnBrk="1" hangingPunct="1">
+              <a:defRPr>
+                <a:solidFill>
+                  <a:schemeClr val="tx2"/>
+                </a:solidFill>
+              </a:defRPr>
+            </a:lvl7pPr>
+            <a:lvl8pPr eaLnBrk="1" hangingPunct="1">
+              <a:defRPr>
+                <a:solidFill>
+                  <a:schemeClr val="tx2"/>
+                </a:solidFill>
+              </a:defRPr>
+            </a:lvl8pPr>
+            <a:lvl9pPr eaLnBrk="1" hangingPunct="1">
+              <a:defRPr>
+                <a:solidFill>
+                  <a:schemeClr val="tx2"/>
+                </a:solidFill>
+              </a:defRPr>
+            </a:lvl9pPr>
+          </a:lstStyle>
+          <a:p>
+            <a:r>
+              <a:rPr lang="en-US" dirty="0"/>
+              <a:t>                 Our NN Policy</a:t>
+            </a:r>
+            <a:endParaRPr lang="en-US" sz="4000" dirty="0"/>
+          </a:p>
+        </p:txBody>
+      </p:sp>
+    </p:spTree>
+    <p:extLst>
+      <p:ext uri="{BB962C8B-B14F-4D97-AF65-F5344CB8AC3E}">
+        <p14:creationId xmlns:p14="http://schemas.microsoft.com/office/powerpoint/2010/main" val="2955002984"/>
+      </p:ext>
+    </p:extLst>
+  </p:cSld>
+  <p:clrMapOvr>
+    <a:masterClrMapping/>
+  </p:clrMapOvr>
+</p:sld>
+</file>
+
+<file path=ppt/slides/slide12.xml><?xml version="1.0" encoding="utf-8"?>
+<p:sld xmlns:a="http://schemas.openxmlformats.org/drawingml/2006/main" xmlns:r="http://schemas.openxmlformats.org/officeDocument/2006/relationships" xmlns:p="http://schemas.openxmlformats.org/presentationml/2006/main">
+  <p:cSld>
+    <p:spTree>
+      <p:nvGrpSpPr>
+        <p:cNvPr id="1" name=""/>
+        <p:cNvGrpSpPr/>
+        <p:nvPr/>
+      </p:nvGrpSpPr>
+      <p:grpSpPr>
+        <a:xfrm>
+          <a:off x="0" y="0"/>
+          <a:ext cx="0" cy="0"/>
+          <a:chOff x="0" y="0"/>
+          <a:chExt cx="0" cy="0"/>
+        </a:xfrm>
+      </p:grpSpPr>
+      <p:sp>
+        <p:nvSpPr>
+          <p:cNvPr id="2" name="Title 1">
+            <a:extLst>
+              <a:ext uri="{FF2B5EF4-FFF2-40B4-BE49-F238E27FC236}">
+                <a16:creationId xmlns:a16="http://schemas.microsoft.com/office/drawing/2014/main" id="{BFE03E1E-1CD4-4BF6-8AB2-07362D59237F}"/>
+              </a:ext>
+            </a:extLst>
+          </p:cNvPr>
+          <p:cNvSpPr>
+            <a:spLocks noGrp="1"/>
+          </p:cNvSpPr>
+          <p:nvPr>
+            <p:ph type="title"/>
+          </p:nvPr>
+        </p:nvSpPr>
+        <p:spPr/>
+        <p:txBody>
+          <a:bodyPr/>
+          <a:lstStyle/>
+          <a:p>
+            <a:r>
+              <a:rPr lang="en-US" dirty="0"/>
+              <a:t>         </a:t>
+            </a:r>
+          </a:p>
+        </p:txBody>
+      </p:sp>
+      <p:sp>
+        <p:nvSpPr>
+          <p:cNvPr id="6" name="Title 1">
+            <a:extLst>
+              <a:ext uri="{FF2B5EF4-FFF2-40B4-BE49-F238E27FC236}">
+                <a16:creationId xmlns:a16="http://schemas.microsoft.com/office/drawing/2014/main" id="{28909404-97CF-447C-9C07-862F156F11DD}"/>
+              </a:ext>
+            </a:extLst>
+          </p:cNvPr>
+          <p:cNvSpPr txBox="1">
+            <a:spLocks/>
+          </p:cNvSpPr>
+          <p:nvPr/>
+        </p:nvSpPr>
+        <p:spPr>
+          <a:xfrm>
+            <a:off x="194345" y="94478"/>
+            <a:ext cx="10551952" cy="1675599"/>
+          </a:xfrm>
+          <a:prstGeom prst="rect">
+            <a:avLst/>
+          </a:prstGeom>
+        </p:spPr>
+        <p:txBody>
+          <a:bodyPr vert="horz" lIns="91440" tIns="45720" rIns="91440" bIns="45720" rtlCol="0" anchor="t">
+            <a:noAutofit/>
+          </a:bodyPr>
+          <a:lstStyle>
+            <a:lvl1pPr algn="l" defTabSz="457200" rtl="0" eaLnBrk="1" latinLnBrk="0" hangingPunct="1">
+              <a:spcBef>
+                <a:spcPct val="0"/>
+              </a:spcBef>
+              <a:buNone/>
+              <a:defRPr sz="4200" b="0" i="0" kern="1200">
+                <a:solidFill>
+                  <a:schemeClr val="tx2"/>
+                </a:solidFill>
+                <a:latin typeface="+mj-lt"/>
+                <a:ea typeface="+mj-ea"/>
+                <a:cs typeface="+mj-cs"/>
+              </a:defRPr>
+            </a:lvl1pPr>
+            <a:lvl2pPr eaLnBrk="1" hangingPunct="1">
+              <a:defRPr>
+                <a:solidFill>
+                  <a:schemeClr val="tx2"/>
+                </a:solidFill>
+              </a:defRPr>
+            </a:lvl2pPr>
+            <a:lvl3pPr eaLnBrk="1" hangingPunct="1">
+              <a:defRPr>
+                <a:solidFill>
+                  <a:schemeClr val="tx2"/>
+                </a:solidFill>
+              </a:defRPr>
+            </a:lvl3pPr>
+            <a:lvl4pPr eaLnBrk="1" hangingPunct="1">
+              <a:defRPr>
+                <a:solidFill>
+                  <a:schemeClr val="tx2"/>
+                </a:solidFill>
+              </a:defRPr>
+            </a:lvl4pPr>
+            <a:lvl5pPr eaLnBrk="1" hangingPunct="1">
+              <a:defRPr>
+                <a:solidFill>
+                  <a:schemeClr val="tx2"/>
+                </a:solidFill>
+              </a:defRPr>
+            </a:lvl5pPr>
+            <a:lvl6pPr eaLnBrk="1" hangingPunct="1">
+              <a:defRPr>
+                <a:solidFill>
+                  <a:schemeClr val="tx2"/>
+                </a:solidFill>
+              </a:defRPr>
+            </a:lvl6pPr>
+            <a:lvl7pPr eaLnBrk="1" hangingPunct="1">
+              <a:defRPr>
+                <a:solidFill>
+                  <a:schemeClr val="tx2"/>
+                </a:solidFill>
+              </a:defRPr>
+            </a:lvl7pPr>
+            <a:lvl8pPr eaLnBrk="1" hangingPunct="1">
+              <a:defRPr>
+                <a:solidFill>
+                  <a:schemeClr val="tx2"/>
+                </a:solidFill>
+              </a:defRPr>
+            </a:lvl8pPr>
+            <a:lvl9pPr eaLnBrk="1" hangingPunct="1">
+              <a:defRPr>
+                <a:solidFill>
+                  <a:schemeClr val="tx2"/>
+                </a:solidFill>
+              </a:defRPr>
+            </a:lvl9pPr>
+          </a:lstStyle>
+          <a:p>
+            <a:r>
+              <a:rPr lang="en-US" dirty="0"/>
               <a:t>                 Summary </a:t>
             </a:r>
             <a:endParaRPr lang="en-US" sz="4000" dirty="0"/>
@@ -7730,7 +8185,7 @@
         <p:spPr>
           <a:xfrm>
             <a:off x="194345" y="1511635"/>
-            <a:ext cx="11803310" cy="3046988"/>
+            <a:ext cx="11803310" cy="3416320"/>
           </a:xfrm>
           <a:prstGeom prst="rect">
             <a:avLst/>
@@ -7749,7 +8204,7 @@
             </a:pPr>
             <a:r>
               <a:rPr lang="en-US" sz="2400" dirty="0"/>
-              <a:t>Learn a mastermind playing policy that is competitive with existing Knuth’s policy and better than a naïve playing policy</a:t>
+              <a:t>Write python program that learn a mastermind playing policy that is competitive with existing known policies and better than a naïve playing policy</a:t>
             </a:r>
           </a:p>
           <a:p>
@@ -8516,12 +8971,410 @@
           <a:p>
             <a:r>
               <a:rPr lang="en-US" dirty="0"/>
-              <a:t>  Previous work in Mastermind Policy</a:t>
+              <a:t>  Previous works in Mastermind Policy</a:t>
             </a:r>
             <a:endParaRPr lang="en-US" sz="4000" dirty="0"/>
           </a:p>
         </p:txBody>
       </p:sp>
+      <p:sp>
+        <p:nvSpPr>
+          <p:cNvPr id="3" name="Rectangle 2">
+            <a:extLst>
+              <a:ext uri="{FF2B5EF4-FFF2-40B4-BE49-F238E27FC236}">
+                <a16:creationId xmlns:a16="http://schemas.microsoft.com/office/drawing/2014/main" id="{083FB12F-FD77-4AED-85EF-3C31C8B913F5}"/>
+              </a:ext>
+            </a:extLst>
+          </p:cNvPr>
+          <p:cNvSpPr/>
+          <p:nvPr/>
+        </p:nvSpPr>
+        <p:spPr>
+          <a:xfrm>
+            <a:off x="434567" y="1204987"/>
+            <a:ext cx="11932467" cy="3693319"/>
+          </a:xfrm>
+          <a:prstGeom prst="rect">
+            <a:avLst/>
+          </a:prstGeom>
+        </p:spPr>
+        <p:txBody>
+          <a:bodyPr wrap="square">
+            <a:spAutoFit/>
+          </a:bodyPr>
+          <a:lstStyle/>
+          <a:p>
+            <a:r>
+              <a:rPr lang="en-US" dirty="0"/>
+              <a:t>Professor  Donald Knuth was able to construct a policy that wins in 5 guess at the worst case and by 4.477 on average  </a:t>
+            </a:r>
+            <a:r>
+              <a:rPr lang="en-US" dirty="0">
+                <a:hlinkClick r:id="rId2"/>
+              </a:rPr>
+              <a:t>https://www.cs.uni.edu/~wallingf/teaching/cs3530/resources/knuth-mastermind.pdf</a:t>
+            </a:r>
+            <a:endParaRPr lang="en-US" dirty="0"/>
+          </a:p>
+          <a:p>
+            <a:endParaRPr lang="en-US" dirty="0"/>
+          </a:p>
+          <a:p>
+            <a:r>
+              <a:rPr lang="en-US" dirty="0">
+                <a:hlinkClick r:id="rId3"/>
+              </a:rPr>
+              <a:t>Koyoma and Lai, 1993  </a:t>
+            </a:r>
+            <a:r>
+              <a:rPr lang="en-US" dirty="0"/>
+              <a:t>found an optimal Mastermind Strategy that guess the code by 4.34  guesses on average (6 guess in the  worst case)</a:t>
+            </a:r>
+          </a:p>
+          <a:p>
+            <a:endParaRPr lang="en-US" dirty="0"/>
+          </a:p>
+          <a:p>
+            <a:endParaRPr lang="en-US" dirty="0"/>
+          </a:p>
+          <a:p>
+            <a:r>
+              <a:rPr lang="en-US" dirty="0"/>
+              <a:t>Summary of few of the most successful mastermind playing policies are  summarized below based on  </a:t>
+            </a:r>
+            <a:r>
+              <a:rPr lang="en-US" dirty="0">
+                <a:hlinkClick r:id="rId4"/>
+              </a:rPr>
+              <a:t> </a:t>
+            </a:r>
+            <a:r>
+              <a:rPr lang="en-US" i="1" dirty="0" err="1">
+                <a:hlinkClick r:id="rId4"/>
+              </a:rPr>
+              <a:t>Barteld</a:t>
+            </a:r>
+            <a:r>
+              <a:rPr lang="en-US" i="1" dirty="0">
+                <a:hlinkClick r:id="rId4"/>
+              </a:rPr>
+              <a:t> Kooi</a:t>
+            </a:r>
+            <a:r>
+              <a:rPr lang="en-US" dirty="0">
+                <a:hlinkClick r:id="rId4"/>
+              </a:rPr>
+              <a:t>1 2005 </a:t>
+            </a:r>
+            <a:r>
+              <a:rPr lang="en-US" dirty="0"/>
+              <a:t>:</a:t>
+            </a:r>
+          </a:p>
+          <a:p>
+            <a:endParaRPr lang="en-US" dirty="0"/>
+          </a:p>
+          <a:p>
+            <a:endParaRPr lang="en-US" dirty="0"/>
+          </a:p>
+          <a:p>
+            <a:endParaRPr lang="en-US" dirty="0"/>
+          </a:p>
+          <a:p>
+            <a:endParaRPr lang="en-US" dirty="0"/>
+          </a:p>
+        </p:txBody>
+      </p:sp>
+      <p:graphicFrame>
+        <p:nvGraphicFramePr>
+          <p:cNvPr id="8" name="Table 7">
+            <a:extLst>
+              <a:ext uri="{FF2B5EF4-FFF2-40B4-BE49-F238E27FC236}">
+                <a16:creationId xmlns:a16="http://schemas.microsoft.com/office/drawing/2014/main" id="{22A3AE0D-B5F5-4996-B57B-B057B4E684B6}"/>
+              </a:ext>
+            </a:extLst>
+          </p:cNvPr>
+          <p:cNvGraphicFramePr>
+            <a:graphicFrameLocks noGrp="1"/>
+          </p:cNvGraphicFramePr>
+          <p:nvPr>
+            <p:extLst>
+              <p:ext uri="{D42A27DB-BD31-4B8C-83A1-F6EECF244321}">
+                <p14:modId xmlns:p14="http://schemas.microsoft.com/office/powerpoint/2010/main" val="1828131972"/>
+              </p:ext>
+            </p:extLst>
+          </p:nvPr>
+        </p:nvGraphicFramePr>
+        <p:xfrm>
+          <a:off x="434567" y="3883936"/>
+          <a:ext cx="7645958" cy="2607398"/>
+        </p:xfrm>
+        <a:graphic>
+          <a:graphicData uri="http://schemas.openxmlformats.org/drawingml/2006/table">
+            <a:tbl>
+              <a:tblPr firstRow="1" bandRow="1">
+                <a:tableStyleId>{5C22544A-7EE6-4342-B048-85BDC9FD1C3A}</a:tableStyleId>
+              </a:tblPr>
+              <a:tblGrid>
+                <a:gridCol w="3822979">
+                  <a:extLst>
+                    <a:ext uri="{9D8B030D-6E8A-4147-A177-3AD203B41FA5}">
+                      <a16:colId xmlns:a16="http://schemas.microsoft.com/office/drawing/2014/main" val="2193605055"/>
+                    </a:ext>
+                  </a:extLst>
+                </a:gridCol>
+                <a:gridCol w="3822979">
+                  <a:extLst>
+                    <a:ext uri="{9D8B030D-6E8A-4147-A177-3AD203B41FA5}">
+                      <a16:colId xmlns:a16="http://schemas.microsoft.com/office/drawing/2014/main" val="4160411429"/>
+                    </a:ext>
+                  </a:extLst>
+                </a:gridCol>
+              </a:tblGrid>
+              <a:tr h="499344">
+                <a:tc>
+                  <a:txBody>
+                    <a:bodyPr/>
+                    <a:lstStyle/>
+                    <a:p>
+                      <a:r>
+                        <a:rPr lang="en-US" dirty="0"/>
+                        <a:t>Policy name </a:t>
+                      </a:r>
+                    </a:p>
+                  </a:txBody>
+                  <a:tcPr/>
+                </a:tc>
+                <a:tc>
+                  <a:txBody>
+                    <a:bodyPr/>
+                    <a:lstStyle/>
+                    <a:p>
+                      <a:r>
+                        <a:rPr lang="en-US" dirty="0"/>
+                        <a:t>Average guess to win </a:t>
+                      </a:r>
+                    </a:p>
+                  </a:txBody>
+                  <a:tcPr/>
+                </a:tc>
+                <a:extLst>
+                  <a:ext uri="{0D108BD9-81ED-4DB2-BD59-A6C34878D82A}">
+                    <a16:rowId xmlns:a16="http://schemas.microsoft.com/office/drawing/2014/main" val="3143422747"/>
+                  </a:ext>
+                </a:extLst>
+              </a:tr>
+              <a:tr h="368153">
+                <a:tc>
+                  <a:txBody>
+                    <a:bodyPr/>
+                    <a:lstStyle/>
+                    <a:p>
+                      <a:r>
+                        <a:rPr lang="en-US" dirty="0"/>
+                        <a:t>Knuth worst case </a:t>
+                      </a:r>
+                    </a:p>
+                  </a:txBody>
+                  <a:tcPr/>
+                </a:tc>
+                <a:tc>
+                  <a:txBody>
+                    <a:bodyPr/>
+                    <a:lstStyle/>
+                    <a:p>
+                      <a:r>
+                        <a:rPr lang="en-US" dirty="0"/>
+                        <a:t>4.476</a:t>
+                      </a:r>
+                    </a:p>
+                  </a:txBody>
+                  <a:tcPr/>
+                </a:tc>
+                <a:extLst>
+                  <a:ext uri="{0D108BD9-81ED-4DB2-BD59-A6C34878D82A}">
+                    <a16:rowId xmlns:a16="http://schemas.microsoft.com/office/drawing/2014/main" val="1462974170"/>
+                  </a:ext>
+                </a:extLst>
+              </a:tr>
+              <a:tr h="368153">
+                <a:tc>
+                  <a:txBody>
+                    <a:bodyPr/>
+                    <a:lstStyle/>
+                    <a:p>
+                      <a:r>
+                        <a:rPr lang="en-US" sz="1800" b="0" i="0" u="none" strike="noStrike" kern="1200" baseline="0" dirty="0">
+                          <a:solidFill>
+                            <a:schemeClr val="dk1"/>
+                          </a:solidFill>
+                          <a:latin typeface="+mn-lt"/>
+                          <a:ea typeface="+mn-ea"/>
+                          <a:cs typeface="+mn-cs"/>
+                        </a:rPr>
+                        <a:t>Expected size</a:t>
+                      </a:r>
+                      <a:endParaRPr lang="en-US" dirty="0"/>
+                    </a:p>
+                  </a:txBody>
+                  <a:tcPr/>
+                </a:tc>
+                <a:tc>
+                  <a:txBody>
+                    <a:bodyPr/>
+                    <a:lstStyle/>
+                    <a:p>
+                      <a:r>
+                        <a:rPr lang="en-US" sz="1800" b="0" i="0" u="none" strike="noStrike" kern="1200" baseline="0" dirty="0">
+                          <a:solidFill>
+                            <a:schemeClr val="dk1"/>
+                          </a:solidFill>
+                          <a:latin typeface="+mn-lt"/>
+                          <a:ea typeface="+mn-ea"/>
+                          <a:cs typeface="+mn-cs"/>
+                        </a:rPr>
+                        <a:t>4.395</a:t>
+                      </a:r>
+                      <a:endParaRPr lang="en-US" dirty="0"/>
+                    </a:p>
+                  </a:txBody>
+                  <a:tcPr/>
+                </a:tc>
+                <a:extLst>
+                  <a:ext uri="{0D108BD9-81ED-4DB2-BD59-A6C34878D82A}">
+                    <a16:rowId xmlns:a16="http://schemas.microsoft.com/office/drawing/2014/main" val="351726747"/>
+                  </a:ext>
+                </a:extLst>
+              </a:tr>
+              <a:tr h="368153">
+                <a:tc>
+                  <a:txBody>
+                    <a:bodyPr/>
+                    <a:lstStyle/>
+                    <a:p>
+                      <a:r>
+                        <a:rPr lang="en-US" dirty="0"/>
+                        <a:t>Entropy </a:t>
+                      </a:r>
+                    </a:p>
+                  </a:txBody>
+                  <a:tcPr/>
+                </a:tc>
+                <a:tc>
+                  <a:txBody>
+                    <a:bodyPr/>
+                    <a:lstStyle/>
+                    <a:p>
+                      <a:r>
+                        <a:rPr lang="en-US" sz="1800" b="0" i="0" u="none" strike="noStrike" kern="1200" baseline="0" dirty="0">
+                          <a:solidFill>
+                            <a:schemeClr val="dk1"/>
+                          </a:solidFill>
+                          <a:latin typeface="+mn-lt"/>
+                          <a:ea typeface="+mn-ea"/>
+                          <a:cs typeface="+mn-cs"/>
+                        </a:rPr>
+                        <a:t>4.415</a:t>
+                      </a:r>
+                      <a:endParaRPr lang="en-US" dirty="0"/>
+                    </a:p>
+                  </a:txBody>
+                  <a:tcPr/>
+                </a:tc>
+                <a:extLst>
+                  <a:ext uri="{0D108BD9-81ED-4DB2-BD59-A6C34878D82A}">
+                    <a16:rowId xmlns:a16="http://schemas.microsoft.com/office/drawing/2014/main" val="2694972590"/>
+                  </a:ext>
+                </a:extLst>
+              </a:tr>
+              <a:tr h="368153">
+                <a:tc>
+                  <a:txBody>
+                    <a:bodyPr/>
+                    <a:lstStyle/>
+                    <a:p>
+                      <a:r>
+                        <a:rPr lang="en-US" dirty="0"/>
+                        <a:t>Most parts </a:t>
+                      </a:r>
+                    </a:p>
+                  </a:txBody>
+                  <a:tcPr/>
+                </a:tc>
+                <a:tc>
+                  <a:txBody>
+                    <a:bodyPr/>
+                    <a:lstStyle/>
+                    <a:p>
+                      <a:r>
+                        <a:rPr lang="en-US" sz="1800" b="0" i="0" u="none" strike="noStrike" kern="1200" baseline="0" dirty="0">
+                          <a:solidFill>
+                            <a:schemeClr val="dk1"/>
+                          </a:solidFill>
+                          <a:latin typeface="+mn-lt"/>
+                          <a:ea typeface="+mn-ea"/>
+                          <a:cs typeface="+mn-cs"/>
+                        </a:rPr>
+                        <a:t>4.373</a:t>
+                      </a:r>
+                      <a:endParaRPr lang="en-US" dirty="0"/>
+                    </a:p>
+                  </a:txBody>
+                  <a:tcPr/>
+                </a:tc>
+                <a:extLst>
+                  <a:ext uri="{0D108BD9-81ED-4DB2-BD59-A6C34878D82A}">
+                    <a16:rowId xmlns:a16="http://schemas.microsoft.com/office/drawing/2014/main" val="944378898"/>
+                  </a:ext>
+                </a:extLst>
+              </a:tr>
+              <a:tr h="635442">
+                <a:tc>
+                  <a:txBody>
+                    <a:bodyPr/>
+                    <a:lstStyle/>
+                    <a:p>
+                      <a:r>
+                        <a:rPr lang="en-US" dirty="0"/>
+                        <a:t>Optimal (</a:t>
+                      </a:r>
+                      <a:r>
+                        <a:rPr lang="en-US" dirty="0">
+                          <a:hlinkClick r:id="rId3"/>
+                        </a:rPr>
+                        <a:t>Koyoma and Lai</a:t>
+                      </a:r>
+                      <a:r>
+                        <a:rPr lang="en-US" dirty="0"/>
+                        <a:t>)</a:t>
+                      </a:r>
+                    </a:p>
+                  </a:txBody>
+                  <a:tcPr/>
+                </a:tc>
+                <a:tc>
+                  <a:txBody>
+                    <a:bodyPr/>
+                    <a:lstStyle/>
+                    <a:p>
+                      <a:r>
+                        <a:rPr lang="en-US" dirty="0"/>
+                        <a:t>4.340</a:t>
+                      </a:r>
+                    </a:p>
+                  </a:txBody>
+                  <a:tcPr/>
+                </a:tc>
+                <a:extLst>
+                  <a:ext uri="{0D108BD9-81ED-4DB2-BD59-A6C34878D82A}">
+                    <a16:rowId xmlns:a16="http://schemas.microsoft.com/office/drawing/2014/main" val="3121445676"/>
+                  </a:ext>
+                </a:extLst>
+              </a:tr>
+            </a:tbl>
+          </a:graphicData>
+        </a:graphic>
+      </p:graphicFrame>
     </p:spTree>
     <p:extLst>
       <p:ext uri="{BB962C8B-B14F-4D97-AF65-F5344CB8AC3E}">
@@ -8682,9 +9535,505 @@
           <a:p>
             <a:r>
               <a:rPr lang="en-US" dirty="0"/>
-              <a:t>         Policy  Simulator  framework </a:t>
+              <a:t>         Policy  evaluation framework </a:t>
             </a:r>
             <a:endParaRPr lang="en-US" sz="4000" dirty="0"/>
+          </a:p>
+        </p:txBody>
+      </p:sp>
+      <p:sp>
+        <p:nvSpPr>
+          <p:cNvPr id="5" name="Rectangle 4">
+            <a:extLst>
+              <a:ext uri="{FF2B5EF4-FFF2-40B4-BE49-F238E27FC236}">
+                <a16:creationId xmlns:a16="http://schemas.microsoft.com/office/drawing/2014/main" id="{968AE50D-8C5E-4241-841F-A54D5C2FDF60}"/>
+              </a:ext>
+            </a:extLst>
+          </p:cNvPr>
+          <p:cNvSpPr/>
+          <p:nvPr/>
+        </p:nvSpPr>
+        <p:spPr>
+          <a:xfrm>
+            <a:off x="3992905" y="1853248"/>
+            <a:ext cx="2607398" cy="1086416"/>
+          </a:xfrm>
+          <a:prstGeom prst="rect">
+            <a:avLst/>
+          </a:prstGeom>
+        </p:spPr>
+        <p:style>
+          <a:lnRef idx="2">
+            <a:schemeClr val="accent6">
+              <a:shade val="50000"/>
+            </a:schemeClr>
+          </a:lnRef>
+          <a:fillRef idx="1">
+            <a:schemeClr val="accent6"/>
+          </a:fillRef>
+          <a:effectRef idx="0">
+            <a:schemeClr val="accent6"/>
+          </a:effectRef>
+          <a:fontRef idx="minor">
+            <a:schemeClr val="lt1"/>
+          </a:fontRef>
+        </p:style>
+        <p:txBody>
+          <a:bodyPr rtlCol="0" anchor="ctr"/>
+          <a:lstStyle/>
+          <a:p>
+            <a:pPr algn="ctr"/>
+            <a:r>
+              <a:rPr lang="en-US" dirty="0"/>
+              <a:t>Strategy tree generation </a:t>
+            </a:r>
+          </a:p>
+        </p:txBody>
+      </p:sp>
+      <p:sp>
+        <p:nvSpPr>
+          <p:cNvPr id="10" name="Rectangle 9">
+            <a:extLst>
+              <a:ext uri="{FF2B5EF4-FFF2-40B4-BE49-F238E27FC236}">
+                <a16:creationId xmlns:a16="http://schemas.microsoft.com/office/drawing/2014/main" id="{43E70271-4C25-41E3-B334-C3BAB9E5FE71}"/>
+              </a:ext>
+            </a:extLst>
+          </p:cNvPr>
+          <p:cNvSpPr/>
+          <p:nvPr/>
+        </p:nvSpPr>
+        <p:spPr>
+          <a:xfrm>
+            <a:off x="950615" y="1861698"/>
+            <a:ext cx="2322132" cy="1077965"/>
+          </a:xfrm>
+          <a:prstGeom prst="rect">
+            <a:avLst/>
+          </a:prstGeom>
+        </p:spPr>
+        <p:style>
+          <a:lnRef idx="2">
+            <a:schemeClr val="accent1">
+              <a:shade val="50000"/>
+            </a:schemeClr>
+          </a:lnRef>
+          <a:fillRef idx="1">
+            <a:schemeClr val="accent1"/>
+          </a:fillRef>
+          <a:effectRef idx="0">
+            <a:schemeClr val="accent1"/>
+          </a:effectRef>
+          <a:fontRef idx="minor">
+            <a:schemeClr val="lt1"/>
+          </a:fontRef>
+        </p:style>
+        <p:txBody>
+          <a:bodyPr rtlCol="0" anchor="ctr"/>
+          <a:lstStyle/>
+          <a:p>
+            <a:pPr algn="ctr"/>
+            <a:r>
+              <a:rPr lang="en-US" dirty="0"/>
+              <a:t>Policy to evaluate </a:t>
+            </a:r>
+          </a:p>
+          <a:p>
+            <a:pPr algn="ctr"/>
+            <a:r>
+              <a:rPr lang="en-US" dirty="0"/>
+              <a:t>guess = (s) </a:t>
+            </a:r>
+          </a:p>
+        </p:txBody>
+      </p:sp>
+      <p:cxnSp>
+        <p:nvCxnSpPr>
+          <p:cNvPr id="12" name="Straight Arrow Connector 11">
+            <a:extLst>
+              <a:ext uri="{FF2B5EF4-FFF2-40B4-BE49-F238E27FC236}">
+                <a16:creationId xmlns:a16="http://schemas.microsoft.com/office/drawing/2014/main" id="{CADCF6F7-C18C-4B41-B14F-DB3486565445}"/>
+              </a:ext>
+            </a:extLst>
+          </p:cNvPr>
+          <p:cNvCxnSpPr>
+            <a:cxnSpLocks/>
+          </p:cNvCxnSpPr>
+          <p:nvPr/>
+        </p:nvCxnSpPr>
+        <p:spPr>
+          <a:xfrm flipV="1">
+            <a:off x="3278881" y="2394343"/>
+            <a:ext cx="720159" cy="4225"/>
+          </a:xfrm>
+          <a:prstGeom prst="straightConnector1">
+            <a:avLst/>
+          </a:prstGeom>
+          <a:ln w="22225">
+            <a:solidFill>
+              <a:schemeClr val="bg1"/>
+            </a:solidFill>
+            <a:tailEnd type="triangle"/>
+          </a:ln>
+        </p:spPr>
+        <p:style>
+          <a:lnRef idx="1">
+            <a:schemeClr val="accent6"/>
+          </a:lnRef>
+          <a:fillRef idx="0">
+            <a:schemeClr val="accent6"/>
+          </a:fillRef>
+          <a:effectRef idx="0">
+            <a:schemeClr val="accent6"/>
+          </a:effectRef>
+          <a:fontRef idx="minor">
+            <a:schemeClr val="tx1"/>
+          </a:fontRef>
+        </p:style>
+      </p:cxnSp>
+      <p:sp>
+        <p:nvSpPr>
+          <p:cNvPr id="13" name="Rectangle 12">
+            <a:extLst>
+              <a:ext uri="{FF2B5EF4-FFF2-40B4-BE49-F238E27FC236}">
+                <a16:creationId xmlns:a16="http://schemas.microsoft.com/office/drawing/2014/main" id="{830C32EF-C412-4267-86C0-FA2904DF1E57}"/>
+              </a:ext>
+            </a:extLst>
+          </p:cNvPr>
+          <p:cNvSpPr/>
+          <p:nvPr/>
+        </p:nvSpPr>
+        <p:spPr>
+          <a:xfrm>
+            <a:off x="7422810" y="1811663"/>
+            <a:ext cx="2144889" cy="1086416"/>
+          </a:xfrm>
+          <a:prstGeom prst="rect">
+            <a:avLst/>
+          </a:prstGeom>
+        </p:spPr>
+        <p:style>
+          <a:lnRef idx="2">
+            <a:schemeClr val="accent4">
+              <a:shade val="50000"/>
+            </a:schemeClr>
+          </a:lnRef>
+          <a:fillRef idx="1">
+            <a:schemeClr val="accent4"/>
+          </a:fillRef>
+          <a:effectRef idx="0">
+            <a:schemeClr val="accent4"/>
+          </a:effectRef>
+          <a:fontRef idx="minor">
+            <a:schemeClr val="lt1"/>
+          </a:fontRef>
+        </p:style>
+        <p:txBody>
+          <a:bodyPr rtlCol="0" anchor="ctr"/>
+          <a:lstStyle/>
+          <a:p>
+            <a:pPr algn="ctr"/>
+            <a:r>
+              <a:rPr lang="en-US" dirty="0"/>
+              <a:t>Strategy Tree</a:t>
+            </a:r>
+          </a:p>
+        </p:txBody>
+      </p:sp>
+      <p:cxnSp>
+        <p:nvCxnSpPr>
+          <p:cNvPr id="15" name="Straight Arrow Connector 14">
+            <a:extLst>
+              <a:ext uri="{FF2B5EF4-FFF2-40B4-BE49-F238E27FC236}">
+                <a16:creationId xmlns:a16="http://schemas.microsoft.com/office/drawing/2014/main" id="{54FEECCC-ED23-4B91-B9C5-90FE3FF045A9}"/>
+              </a:ext>
+            </a:extLst>
+          </p:cNvPr>
+          <p:cNvCxnSpPr>
+            <a:stCxn id="5" idx="3"/>
+          </p:cNvCxnSpPr>
+          <p:nvPr/>
+        </p:nvCxnSpPr>
+        <p:spPr>
+          <a:xfrm>
+            <a:off x="6600303" y="2396456"/>
+            <a:ext cx="822507" cy="0"/>
+          </a:xfrm>
+          <a:prstGeom prst="straightConnector1">
+            <a:avLst/>
+          </a:prstGeom>
+          <a:ln w="22225">
+            <a:solidFill>
+              <a:schemeClr val="bg1"/>
+            </a:solidFill>
+            <a:tailEnd type="triangle"/>
+          </a:ln>
+        </p:spPr>
+        <p:style>
+          <a:lnRef idx="1">
+            <a:schemeClr val="accent1"/>
+          </a:lnRef>
+          <a:fillRef idx="0">
+            <a:schemeClr val="accent1"/>
+          </a:fillRef>
+          <a:effectRef idx="0">
+            <a:schemeClr val="accent1"/>
+          </a:effectRef>
+          <a:fontRef idx="minor">
+            <a:schemeClr val="tx1"/>
+          </a:fontRef>
+        </p:style>
+      </p:cxnSp>
+      <p:sp>
+        <p:nvSpPr>
+          <p:cNvPr id="17" name="Rectangle: Rounded Corners 16">
+            <a:extLst>
+              <a:ext uri="{FF2B5EF4-FFF2-40B4-BE49-F238E27FC236}">
+                <a16:creationId xmlns:a16="http://schemas.microsoft.com/office/drawing/2014/main" id="{55F2F7FD-6679-41F6-9AFC-ADB28546D9F0}"/>
+              </a:ext>
+            </a:extLst>
+          </p:cNvPr>
+          <p:cNvSpPr/>
+          <p:nvPr/>
+        </p:nvSpPr>
+        <p:spPr>
+          <a:xfrm>
+            <a:off x="7422810" y="3603589"/>
+            <a:ext cx="2460978" cy="1086415"/>
+          </a:xfrm>
+          <a:prstGeom prst="roundRect">
+            <a:avLst/>
+          </a:prstGeom>
+        </p:spPr>
+        <p:style>
+          <a:lnRef idx="1">
+            <a:schemeClr val="accent3"/>
+          </a:lnRef>
+          <a:fillRef idx="3">
+            <a:schemeClr val="accent3"/>
+          </a:fillRef>
+          <a:effectRef idx="2">
+            <a:schemeClr val="accent3"/>
+          </a:effectRef>
+          <a:fontRef idx="minor">
+            <a:schemeClr val="lt1"/>
+          </a:fontRef>
+        </p:style>
+        <p:txBody>
+          <a:bodyPr rtlCol="0" anchor="ctr"/>
+          <a:lstStyle/>
+          <a:p>
+            <a:pPr algn="ctr"/>
+            <a:r>
+              <a:rPr lang="en-US" dirty="0"/>
+              <a:t>Simulator </a:t>
+            </a:r>
+          </a:p>
+        </p:txBody>
+      </p:sp>
+      <p:cxnSp>
+        <p:nvCxnSpPr>
+          <p:cNvPr id="19" name="Straight Arrow Connector 18">
+            <a:extLst>
+              <a:ext uri="{FF2B5EF4-FFF2-40B4-BE49-F238E27FC236}">
+                <a16:creationId xmlns:a16="http://schemas.microsoft.com/office/drawing/2014/main" id="{E4AE4FE4-B54B-4FCD-AB43-C1EDB21C3003}"/>
+              </a:ext>
+            </a:extLst>
+          </p:cNvPr>
+          <p:cNvCxnSpPr>
+            <a:stCxn id="13" idx="2"/>
+          </p:cNvCxnSpPr>
+          <p:nvPr/>
+        </p:nvCxnSpPr>
+        <p:spPr>
+          <a:xfrm>
+            <a:off x="8495255" y="2898079"/>
+            <a:ext cx="27856" cy="705510"/>
+          </a:xfrm>
+          <a:prstGeom prst="straightConnector1">
+            <a:avLst/>
+          </a:prstGeom>
+          <a:ln w="22225">
+            <a:solidFill>
+              <a:schemeClr val="bg1"/>
+            </a:solidFill>
+            <a:tailEnd type="triangle"/>
+          </a:ln>
+        </p:spPr>
+        <p:style>
+          <a:lnRef idx="1">
+            <a:schemeClr val="accent1"/>
+          </a:lnRef>
+          <a:fillRef idx="0">
+            <a:schemeClr val="accent1"/>
+          </a:fillRef>
+          <a:effectRef idx="0">
+            <a:schemeClr val="accent1"/>
+          </a:effectRef>
+          <a:fontRef idx="minor">
+            <a:schemeClr val="tx1"/>
+          </a:fontRef>
+        </p:style>
+      </p:cxnSp>
+      <p:sp>
+        <p:nvSpPr>
+          <p:cNvPr id="20" name="Rectangle 19">
+            <a:extLst>
+              <a:ext uri="{FF2B5EF4-FFF2-40B4-BE49-F238E27FC236}">
+                <a16:creationId xmlns:a16="http://schemas.microsoft.com/office/drawing/2014/main" id="{A9EA4CD8-29DA-4114-BC4B-3D5DAD02ED41}"/>
+              </a:ext>
+            </a:extLst>
+          </p:cNvPr>
+          <p:cNvSpPr/>
+          <p:nvPr/>
+        </p:nvSpPr>
+        <p:spPr>
+          <a:xfrm>
+            <a:off x="7130880" y="5485251"/>
+            <a:ext cx="3450531" cy="486572"/>
+          </a:xfrm>
+          <a:prstGeom prst="rect">
+            <a:avLst/>
+          </a:prstGeom>
+          <a:solidFill>
+            <a:srgbClr val="92D050"/>
+          </a:solidFill>
+          <a:ln>
+            <a:solidFill>
+              <a:srgbClr val="92D050"/>
+            </a:solidFill>
+          </a:ln>
+        </p:spPr>
+        <p:style>
+          <a:lnRef idx="2">
+            <a:schemeClr val="accent1">
+              <a:shade val="50000"/>
+            </a:schemeClr>
+          </a:lnRef>
+          <a:fillRef idx="1">
+            <a:schemeClr val="accent1"/>
+          </a:fillRef>
+          <a:effectRef idx="0">
+            <a:schemeClr val="accent1"/>
+          </a:effectRef>
+          <a:fontRef idx="minor">
+            <a:schemeClr val="lt1"/>
+          </a:fontRef>
+        </p:style>
+        <p:txBody>
+          <a:bodyPr rtlCol="0" anchor="ctr"/>
+          <a:lstStyle/>
+          <a:p>
+            <a:pPr algn="ctr"/>
+            <a:r>
+              <a:rPr lang="en-US" dirty="0"/>
+              <a:t>Policy score and statistics </a:t>
+            </a:r>
+          </a:p>
+        </p:txBody>
+      </p:sp>
+      <p:cxnSp>
+        <p:nvCxnSpPr>
+          <p:cNvPr id="22" name="Straight Arrow Connector 21">
+            <a:extLst>
+              <a:ext uri="{FF2B5EF4-FFF2-40B4-BE49-F238E27FC236}">
+                <a16:creationId xmlns:a16="http://schemas.microsoft.com/office/drawing/2014/main" id="{6A46A550-0B9D-40B7-B16A-AB2E2618F6EE}"/>
+              </a:ext>
+            </a:extLst>
+          </p:cNvPr>
+          <p:cNvCxnSpPr>
+            <a:cxnSpLocks/>
+          </p:cNvCxnSpPr>
+          <p:nvPr/>
+        </p:nvCxnSpPr>
+        <p:spPr>
+          <a:xfrm>
+            <a:off x="8634085" y="4690004"/>
+            <a:ext cx="0" cy="795247"/>
+          </a:xfrm>
+          <a:prstGeom prst="straightConnector1">
+            <a:avLst/>
+          </a:prstGeom>
+          <a:ln w="22225">
+            <a:solidFill>
+              <a:schemeClr val="bg1"/>
+            </a:solidFill>
+            <a:tailEnd type="triangle"/>
+          </a:ln>
+        </p:spPr>
+        <p:style>
+          <a:lnRef idx="1">
+            <a:schemeClr val="accent1"/>
+          </a:lnRef>
+          <a:fillRef idx="0">
+            <a:schemeClr val="accent1"/>
+          </a:fillRef>
+          <a:effectRef idx="0">
+            <a:schemeClr val="accent1"/>
+          </a:effectRef>
+          <a:fontRef idx="minor">
+            <a:schemeClr val="tx1"/>
+          </a:fontRef>
+        </p:style>
+      </p:cxnSp>
+      <p:sp>
+        <p:nvSpPr>
+          <p:cNvPr id="23" name="TextBox 22">
+            <a:extLst>
+              <a:ext uri="{FF2B5EF4-FFF2-40B4-BE49-F238E27FC236}">
+                <a16:creationId xmlns:a16="http://schemas.microsoft.com/office/drawing/2014/main" id="{24582EBC-508E-4638-A5EC-C1A22C280F51}"/>
+              </a:ext>
+            </a:extLst>
+          </p:cNvPr>
+          <p:cNvSpPr txBox="1"/>
+          <p:nvPr/>
+        </p:nvSpPr>
+        <p:spPr>
+          <a:xfrm>
+            <a:off x="54793" y="3296593"/>
+            <a:ext cx="6631967" cy="3416320"/>
+          </a:xfrm>
+          <a:prstGeom prst="rect">
+            <a:avLst/>
+          </a:prstGeom>
+          <a:noFill/>
+        </p:spPr>
+        <p:txBody>
+          <a:bodyPr wrap="square" rtlCol="0">
+            <a:spAutoFit/>
+          </a:bodyPr>
+          <a:lstStyle/>
+          <a:p>
+            <a:r>
+              <a:rPr lang="en-US" dirty="0"/>
+              <a:t>1. A policy function that takes state S (list of qualifying guess candidates ) and  generates a guess to ask is create</a:t>
+            </a:r>
+          </a:p>
+          <a:p>
+            <a:endParaRPr lang="en-US" dirty="0"/>
+          </a:p>
+          <a:p>
+            <a:r>
+              <a:rPr lang="en-US" dirty="0"/>
+              <a:t>2. Strategy game tree is generated  from the policy to be able to simulates many games efficiently </a:t>
+            </a:r>
+          </a:p>
+          <a:p>
+            <a:endParaRPr lang="en-US" dirty="0"/>
+          </a:p>
+          <a:p>
+            <a:r>
+              <a:rPr lang="en-US" dirty="0"/>
+              <a:t>3. The simulator is constructed with a strategy tree as an input </a:t>
+            </a:r>
+          </a:p>
+          <a:p>
+            <a:endParaRPr lang="en-US" dirty="0"/>
+          </a:p>
+          <a:p>
+            <a:r>
+              <a:rPr lang="en-US" dirty="0"/>
+              <a:t>4. The simulator simulates games against all coded and generate the score for the policy </a:t>
+            </a:r>
           </a:p>
         </p:txBody>
       </p:sp>
@@ -8848,16 +10197,669 @@
           <a:p>
             <a:r>
               <a:rPr lang="en-US" dirty="0"/>
-              <a:t>                 Random  Policy</a:t>
+              <a:t>                 Strategy tree </a:t>
             </a:r>
             <a:endParaRPr lang="en-US" sz="4000" dirty="0"/>
           </a:p>
         </p:txBody>
       </p:sp>
+      <p:sp>
+        <p:nvSpPr>
+          <p:cNvPr id="3" name="TextBox 2">
+            <a:extLst>
+              <a:ext uri="{FF2B5EF4-FFF2-40B4-BE49-F238E27FC236}">
+                <a16:creationId xmlns:a16="http://schemas.microsoft.com/office/drawing/2014/main" id="{4F011258-069D-4C63-9E27-47790C8A8203}"/>
+              </a:ext>
+            </a:extLst>
+          </p:cNvPr>
+          <p:cNvSpPr txBox="1"/>
+          <p:nvPr/>
+        </p:nvSpPr>
+        <p:spPr>
+          <a:xfrm>
+            <a:off x="860078" y="1340837"/>
+            <a:ext cx="9521747" cy="2031325"/>
+          </a:xfrm>
+          <a:prstGeom prst="rect">
+            <a:avLst/>
+          </a:prstGeom>
+          <a:noFill/>
+        </p:spPr>
+        <p:txBody>
+          <a:bodyPr wrap="square" rtlCol="0">
+            <a:spAutoFit/>
+          </a:bodyPr>
+          <a:lstStyle/>
+          <a:p>
+            <a:r>
+              <a:rPr lang="en-US" dirty="0"/>
+              <a:t>Provides a full description of  how to play the full  game given any response. It is a directed graph with 15 children nodes – one for each  possible response  :</a:t>
+            </a:r>
+          </a:p>
+          <a:p>
+            <a:endParaRPr lang="en-US" dirty="0"/>
+          </a:p>
+          <a:p>
+            <a:r>
+              <a:rPr lang="en-US" dirty="0"/>
+              <a:t>                                                       </a:t>
+            </a:r>
+          </a:p>
+          <a:p>
+            <a:r>
+              <a:rPr lang="en-US" dirty="0"/>
+              <a:t>                                                  </a:t>
+            </a:r>
+          </a:p>
+          <a:p>
+            <a:endParaRPr lang="en-US" dirty="0"/>
+          </a:p>
+          <a:p>
+            <a:r>
+              <a:rPr lang="en-US" dirty="0"/>
+              <a:t>  </a:t>
+            </a:r>
+          </a:p>
+        </p:txBody>
+      </p:sp>
+      <p:sp>
+        <p:nvSpPr>
+          <p:cNvPr id="4" name="Rectangle 3">
+            <a:extLst>
+              <a:ext uri="{FF2B5EF4-FFF2-40B4-BE49-F238E27FC236}">
+                <a16:creationId xmlns:a16="http://schemas.microsoft.com/office/drawing/2014/main" id="{1C9CA90F-F14F-4C61-B3BC-D9DB3E798EC2}"/>
+              </a:ext>
+            </a:extLst>
+          </p:cNvPr>
+          <p:cNvSpPr/>
+          <p:nvPr/>
+        </p:nvSpPr>
+        <p:spPr>
+          <a:xfrm>
+            <a:off x="4874040" y="2583911"/>
+            <a:ext cx="1493821" cy="640354"/>
+          </a:xfrm>
+          <a:prstGeom prst="rect">
+            <a:avLst/>
+          </a:prstGeom>
+        </p:spPr>
+        <p:style>
+          <a:lnRef idx="2">
+            <a:schemeClr val="accent1">
+              <a:shade val="50000"/>
+            </a:schemeClr>
+          </a:lnRef>
+          <a:fillRef idx="1">
+            <a:schemeClr val="accent1"/>
+          </a:fillRef>
+          <a:effectRef idx="0">
+            <a:schemeClr val="accent1"/>
+          </a:effectRef>
+          <a:fontRef idx="minor">
+            <a:schemeClr val="lt1"/>
+          </a:fontRef>
+        </p:style>
+        <p:txBody>
+          <a:bodyPr rtlCol="0" anchor="ctr"/>
+          <a:lstStyle/>
+          <a:p>
+            <a:pPr algn="ctr"/>
+            <a:r>
+              <a:rPr lang="en-US" dirty="0"/>
+              <a:t>First guess </a:t>
+            </a:r>
+          </a:p>
+        </p:txBody>
+      </p:sp>
+      <p:sp>
+        <p:nvSpPr>
+          <p:cNvPr id="5" name="Rectangle 4">
+            <a:extLst>
+              <a:ext uri="{FF2B5EF4-FFF2-40B4-BE49-F238E27FC236}">
+                <a16:creationId xmlns:a16="http://schemas.microsoft.com/office/drawing/2014/main" id="{765E3BDE-B399-483C-8F93-6435475A77CA}"/>
+              </a:ext>
+            </a:extLst>
+          </p:cNvPr>
+          <p:cNvSpPr/>
+          <p:nvPr/>
+        </p:nvSpPr>
+        <p:spPr>
+          <a:xfrm>
+            <a:off x="483149" y="4038100"/>
+            <a:ext cx="1535773" cy="769289"/>
+          </a:xfrm>
+          <a:prstGeom prst="rect">
+            <a:avLst/>
+          </a:prstGeom>
+        </p:spPr>
+        <p:style>
+          <a:lnRef idx="2">
+            <a:schemeClr val="accent1">
+              <a:shade val="50000"/>
+            </a:schemeClr>
+          </a:lnRef>
+          <a:fillRef idx="1">
+            <a:schemeClr val="accent1"/>
+          </a:fillRef>
+          <a:effectRef idx="0">
+            <a:schemeClr val="accent1"/>
+          </a:effectRef>
+          <a:fontRef idx="minor">
+            <a:schemeClr val="lt1"/>
+          </a:fontRef>
+        </p:style>
+        <p:txBody>
+          <a:bodyPr rtlCol="0" anchor="ctr"/>
+          <a:lstStyle/>
+          <a:p>
+            <a:pPr algn="ctr"/>
+            <a:r>
+              <a:rPr lang="en-US" dirty="0"/>
+              <a:t>Guess for  </a:t>
+            </a:r>
+          </a:p>
+          <a:p>
+            <a:pPr algn="ctr"/>
+            <a:r>
+              <a:rPr lang="en-US" dirty="0"/>
+              <a:t>{0,0} response </a:t>
+            </a:r>
+          </a:p>
+        </p:txBody>
+      </p:sp>
+      <p:sp>
+        <p:nvSpPr>
+          <p:cNvPr id="10" name="TextBox 9">
+            <a:extLst>
+              <a:ext uri="{FF2B5EF4-FFF2-40B4-BE49-F238E27FC236}">
+                <a16:creationId xmlns:a16="http://schemas.microsoft.com/office/drawing/2014/main" id="{73445381-CBA3-4692-872C-10167C316667}"/>
+              </a:ext>
+            </a:extLst>
+          </p:cNvPr>
+          <p:cNvSpPr txBox="1"/>
+          <p:nvPr/>
+        </p:nvSpPr>
+        <p:spPr>
+          <a:xfrm>
+            <a:off x="6441046" y="4260281"/>
+            <a:ext cx="2786440" cy="369332"/>
+          </a:xfrm>
+          <a:prstGeom prst="rect">
+            <a:avLst/>
+          </a:prstGeom>
+          <a:noFill/>
+        </p:spPr>
+        <p:txBody>
+          <a:bodyPr wrap="square" rtlCol="0">
+            <a:spAutoFit/>
+          </a:bodyPr>
+          <a:lstStyle/>
+          <a:p>
+            <a:r>
+              <a:rPr lang="en-US" dirty="0"/>
+              <a:t>…..</a:t>
+            </a:r>
+          </a:p>
+        </p:txBody>
+      </p:sp>
+      <p:sp>
+        <p:nvSpPr>
+          <p:cNvPr id="34" name="Rectangle 33">
+            <a:extLst>
+              <a:ext uri="{FF2B5EF4-FFF2-40B4-BE49-F238E27FC236}">
+                <a16:creationId xmlns:a16="http://schemas.microsoft.com/office/drawing/2014/main" id="{D1DF2B1F-BE15-4723-A08C-3748566ED41D}"/>
+              </a:ext>
+            </a:extLst>
+          </p:cNvPr>
+          <p:cNvSpPr/>
+          <p:nvPr/>
+        </p:nvSpPr>
+        <p:spPr>
+          <a:xfrm>
+            <a:off x="2366271" y="4038100"/>
+            <a:ext cx="1535773" cy="769289"/>
+          </a:xfrm>
+          <a:prstGeom prst="rect">
+            <a:avLst/>
+          </a:prstGeom>
+        </p:spPr>
+        <p:style>
+          <a:lnRef idx="2">
+            <a:schemeClr val="accent1">
+              <a:shade val="50000"/>
+            </a:schemeClr>
+          </a:lnRef>
+          <a:fillRef idx="1">
+            <a:schemeClr val="accent1"/>
+          </a:fillRef>
+          <a:effectRef idx="0">
+            <a:schemeClr val="accent1"/>
+          </a:effectRef>
+          <a:fontRef idx="minor">
+            <a:schemeClr val="lt1"/>
+          </a:fontRef>
+        </p:style>
+        <p:txBody>
+          <a:bodyPr rtlCol="0" anchor="ctr"/>
+          <a:lstStyle/>
+          <a:p>
+            <a:pPr algn="ctr"/>
+            <a:r>
+              <a:rPr lang="en-US" dirty="0"/>
+              <a:t>Guess for  </a:t>
+            </a:r>
+          </a:p>
+          <a:p>
+            <a:pPr algn="ctr"/>
+            <a:r>
+              <a:rPr lang="en-US" dirty="0"/>
+              <a:t>{0,1} response </a:t>
+            </a:r>
+          </a:p>
+        </p:txBody>
+      </p:sp>
+      <p:sp>
+        <p:nvSpPr>
+          <p:cNvPr id="35" name="Rectangle 34">
+            <a:extLst>
+              <a:ext uri="{FF2B5EF4-FFF2-40B4-BE49-F238E27FC236}">
+                <a16:creationId xmlns:a16="http://schemas.microsoft.com/office/drawing/2014/main" id="{194685B0-BFC5-4710-A4AE-4276710E3CA5}"/>
+              </a:ext>
+            </a:extLst>
+          </p:cNvPr>
+          <p:cNvSpPr/>
+          <p:nvPr/>
+        </p:nvSpPr>
+        <p:spPr>
+          <a:xfrm>
+            <a:off x="4323028" y="4038100"/>
+            <a:ext cx="1535773" cy="769289"/>
+          </a:xfrm>
+          <a:prstGeom prst="rect">
+            <a:avLst/>
+          </a:prstGeom>
+        </p:spPr>
+        <p:style>
+          <a:lnRef idx="2">
+            <a:schemeClr val="accent1">
+              <a:shade val="50000"/>
+            </a:schemeClr>
+          </a:lnRef>
+          <a:fillRef idx="1">
+            <a:schemeClr val="accent1"/>
+          </a:fillRef>
+          <a:effectRef idx="0">
+            <a:schemeClr val="accent1"/>
+          </a:effectRef>
+          <a:fontRef idx="minor">
+            <a:schemeClr val="lt1"/>
+          </a:fontRef>
+        </p:style>
+        <p:txBody>
+          <a:bodyPr rtlCol="0" anchor="ctr"/>
+          <a:lstStyle/>
+          <a:p>
+            <a:pPr algn="ctr"/>
+            <a:r>
+              <a:rPr lang="en-US" dirty="0"/>
+              <a:t>Guess for  </a:t>
+            </a:r>
+          </a:p>
+          <a:p>
+            <a:pPr algn="ctr"/>
+            <a:r>
+              <a:rPr lang="en-US" dirty="0"/>
+              <a:t>{0,2} response </a:t>
+            </a:r>
+          </a:p>
+        </p:txBody>
+      </p:sp>
+      <p:sp>
+        <p:nvSpPr>
+          <p:cNvPr id="36" name="Rectangle 35">
+            <a:extLst>
+              <a:ext uri="{FF2B5EF4-FFF2-40B4-BE49-F238E27FC236}">
+                <a16:creationId xmlns:a16="http://schemas.microsoft.com/office/drawing/2014/main" id="{D06227CC-2D01-47F1-81A7-5E3505C1033C}"/>
+              </a:ext>
+            </a:extLst>
+          </p:cNvPr>
+          <p:cNvSpPr/>
+          <p:nvPr/>
+        </p:nvSpPr>
+        <p:spPr>
+          <a:xfrm>
+            <a:off x="8878040" y="4038099"/>
+            <a:ext cx="1535773" cy="769289"/>
+          </a:xfrm>
+          <a:prstGeom prst="rect">
+            <a:avLst/>
+          </a:prstGeom>
+        </p:spPr>
+        <p:style>
+          <a:lnRef idx="2">
+            <a:schemeClr val="accent1">
+              <a:shade val="50000"/>
+            </a:schemeClr>
+          </a:lnRef>
+          <a:fillRef idx="1">
+            <a:schemeClr val="accent1"/>
+          </a:fillRef>
+          <a:effectRef idx="0">
+            <a:schemeClr val="accent1"/>
+          </a:effectRef>
+          <a:fontRef idx="minor">
+            <a:schemeClr val="lt1"/>
+          </a:fontRef>
+        </p:style>
+        <p:txBody>
+          <a:bodyPr rtlCol="0" anchor="ctr"/>
+          <a:lstStyle/>
+          <a:p>
+            <a:pPr algn="ctr"/>
+            <a:r>
+              <a:rPr lang="en-US" dirty="0"/>
+              <a:t>Winning if   </a:t>
+            </a:r>
+          </a:p>
+          <a:p>
+            <a:pPr algn="ctr"/>
+            <a:r>
+              <a:rPr lang="en-US" dirty="0"/>
+              <a:t>{4,0} response </a:t>
+            </a:r>
+          </a:p>
+        </p:txBody>
+      </p:sp>
+      <p:cxnSp>
+        <p:nvCxnSpPr>
+          <p:cNvPr id="43" name="Straight Arrow Connector 42">
+            <a:extLst>
+              <a:ext uri="{FF2B5EF4-FFF2-40B4-BE49-F238E27FC236}">
+                <a16:creationId xmlns:a16="http://schemas.microsoft.com/office/drawing/2014/main" id="{FD75AD78-A5EF-47B3-953F-E2431C92576C}"/>
+              </a:ext>
+            </a:extLst>
+          </p:cNvPr>
+          <p:cNvCxnSpPr>
+            <a:stCxn id="4" idx="2"/>
+            <a:endCxn id="34" idx="0"/>
+          </p:cNvCxnSpPr>
+          <p:nvPr/>
+        </p:nvCxnSpPr>
+        <p:spPr>
+          <a:xfrm flipH="1">
+            <a:off x="3134158" y="3224265"/>
+            <a:ext cx="2486793" cy="813835"/>
+          </a:xfrm>
+          <a:prstGeom prst="straightConnector1">
+            <a:avLst/>
+          </a:prstGeom>
+          <a:ln>
+            <a:tailEnd type="triangle"/>
+          </a:ln>
+        </p:spPr>
+        <p:style>
+          <a:lnRef idx="1">
+            <a:schemeClr val="accent1"/>
+          </a:lnRef>
+          <a:fillRef idx="0">
+            <a:schemeClr val="accent1"/>
+          </a:fillRef>
+          <a:effectRef idx="0">
+            <a:schemeClr val="accent1"/>
+          </a:effectRef>
+          <a:fontRef idx="minor">
+            <a:schemeClr val="tx1"/>
+          </a:fontRef>
+        </p:style>
+      </p:cxnSp>
+      <p:cxnSp>
+        <p:nvCxnSpPr>
+          <p:cNvPr id="45" name="Straight Arrow Connector 44">
+            <a:extLst>
+              <a:ext uri="{FF2B5EF4-FFF2-40B4-BE49-F238E27FC236}">
+                <a16:creationId xmlns:a16="http://schemas.microsoft.com/office/drawing/2014/main" id="{20625B19-8F82-484F-A80C-F6E3947949D4}"/>
+              </a:ext>
+            </a:extLst>
+          </p:cNvPr>
+          <p:cNvCxnSpPr>
+            <a:stCxn id="4" idx="2"/>
+            <a:endCxn id="35" idx="0"/>
+          </p:cNvCxnSpPr>
+          <p:nvPr/>
+        </p:nvCxnSpPr>
+        <p:spPr>
+          <a:xfrm flipH="1">
+            <a:off x="5090915" y="3224265"/>
+            <a:ext cx="530036" cy="813835"/>
+          </a:xfrm>
+          <a:prstGeom prst="straightConnector1">
+            <a:avLst/>
+          </a:prstGeom>
+          <a:ln>
+            <a:tailEnd type="triangle"/>
+          </a:ln>
+        </p:spPr>
+        <p:style>
+          <a:lnRef idx="1">
+            <a:schemeClr val="accent1"/>
+          </a:lnRef>
+          <a:fillRef idx="0">
+            <a:schemeClr val="accent1"/>
+          </a:fillRef>
+          <a:effectRef idx="0">
+            <a:schemeClr val="accent1"/>
+          </a:effectRef>
+          <a:fontRef idx="minor">
+            <a:schemeClr val="tx1"/>
+          </a:fontRef>
+        </p:style>
+      </p:cxnSp>
+      <p:cxnSp>
+        <p:nvCxnSpPr>
+          <p:cNvPr id="47" name="Straight Arrow Connector 46">
+            <a:extLst>
+              <a:ext uri="{FF2B5EF4-FFF2-40B4-BE49-F238E27FC236}">
+                <a16:creationId xmlns:a16="http://schemas.microsoft.com/office/drawing/2014/main" id="{903C449F-A915-4AA7-A742-0FF053B50982}"/>
+              </a:ext>
+            </a:extLst>
+          </p:cNvPr>
+          <p:cNvCxnSpPr>
+            <a:stCxn id="4" idx="2"/>
+            <a:endCxn id="36" idx="0"/>
+          </p:cNvCxnSpPr>
+          <p:nvPr/>
+        </p:nvCxnSpPr>
+        <p:spPr>
+          <a:xfrm>
+            <a:off x="5620951" y="3224265"/>
+            <a:ext cx="4024976" cy="813834"/>
+          </a:xfrm>
+          <a:prstGeom prst="straightConnector1">
+            <a:avLst/>
+          </a:prstGeom>
+          <a:ln>
+            <a:tailEnd type="triangle"/>
+          </a:ln>
+        </p:spPr>
+        <p:style>
+          <a:lnRef idx="1">
+            <a:schemeClr val="accent1"/>
+          </a:lnRef>
+          <a:fillRef idx="0">
+            <a:schemeClr val="accent1"/>
+          </a:fillRef>
+          <a:effectRef idx="0">
+            <a:schemeClr val="accent1"/>
+          </a:effectRef>
+          <a:fontRef idx="minor">
+            <a:schemeClr val="tx1"/>
+          </a:fontRef>
+        </p:style>
+      </p:cxnSp>
+      <p:cxnSp>
+        <p:nvCxnSpPr>
+          <p:cNvPr id="52" name="Straight Arrow Connector 51">
+            <a:extLst>
+              <a:ext uri="{FF2B5EF4-FFF2-40B4-BE49-F238E27FC236}">
+                <a16:creationId xmlns:a16="http://schemas.microsoft.com/office/drawing/2014/main" id="{2CB70FA8-A051-4CE1-9CA0-08CCAF44F68B}"/>
+              </a:ext>
+            </a:extLst>
+          </p:cNvPr>
+          <p:cNvCxnSpPr>
+            <a:stCxn id="5" idx="2"/>
+          </p:cNvCxnSpPr>
+          <p:nvPr/>
+        </p:nvCxnSpPr>
+        <p:spPr>
+          <a:xfrm>
+            <a:off x="1251036" y="4807389"/>
+            <a:ext cx="0" cy="679011"/>
+          </a:xfrm>
+          <a:prstGeom prst="straightConnector1">
+            <a:avLst/>
+          </a:prstGeom>
+          <a:ln>
+            <a:tailEnd type="triangle"/>
+          </a:ln>
+        </p:spPr>
+        <p:style>
+          <a:lnRef idx="1">
+            <a:schemeClr val="accent3"/>
+          </a:lnRef>
+          <a:fillRef idx="0">
+            <a:schemeClr val="accent3"/>
+          </a:fillRef>
+          <a:effectRef idx="0">
+            <a:schemeClr val="accent3"/>
+          </a:effectRef>
+          <a:fontRef idx="minor">
+            <a:schemeClr val="tx1"/>
+          </a:fontRef>
+        </p:style>
+      </p:cxnSp>
+      <p:cxnSp>
+        <p:nvCxnSpPr>
+          <p:cNvPr id="53" name="Straight Arrow Connector 52">
+            <a:extLst>
+              <a:ext uri="{FF2B5EF4-FFF2-40B4-BE49-F238E27FC236}">
+                <a16:creationId xmlns:a16="http://schemas.microsoft.com/office/drawing/2014/main" id="{B6EC2BA6-B051-4DDF-9AC9-69A21EEB9667}"/>
+              </a:ext>
+            </a:extLst>
+          </p:cNvPr>
+          <p:cNvCxnSpPr/>
+          <p:nvPr/>
+        </p:nvCxnSpPr>
+        <p:spPr>
+          <a:xfrm>
+            <a:off x="3098093" y="4807389"/>
+            <a:ext cx="0" cy="679011"/>
+          </a:xfrm>
+          <a:prstGeom prst="straightConnector1">
+            <a:avLst/>
+          </a:prstGeom>
+          <a:ln>
+            <a:tailEnd type="triangle"/>
+          </a:ln>
+        </p:spPr>
+        <p:style>
+          <a:lnRef idx="1">
+            <a:schemeClr val="accent3"/>
+          </a:lnRef>
+          <a:fillRef idx="0">
+            <a:schemeClr val="accent3"/>
+          </a:fillRef>
+          <a:effectRef idx="0">
+            <a:schemeClr val="accent3"/>
+          </a:effectRef>
+          <a:fontRef idx="minor">
+            <a:schemeClr val="tx1"/>
+          </a:fontRef>
+        </p:style>
+      </p:cxnSp>
+      <p:cxnSp>
+        <p:nvCxnSpPr>
+          <p:cNvPr id="54" name="Straight Arrow Connector 53">
+            <a:extLst>
+              <a:ext uri="{FF2B5EF4-FFF2-40B4-BE49-F238E27FC236}">
+                <a16:creationId xmlns:a16="http://schemas.microsoft.com/office/drawing/2014/main" id="{808B8726-7FE8-460C-84FB-96B6247FFC9D}"/>
+              </a:ext>
+            </a:extLst>
+          </p:cNvPr>
+          <p:cNvCxnSpPr/>
+          <p:nvPr/>
+        </p:nvCxnSpPr>
+        <p:spPr>
+          <a:xfrm>
+            <a:off x="5082160" y="4807389"/>
+            <a:ext cx="0" cy="679011"/>
+          </a:xfrm>
+          <a:prstGeom prst="straightConnector1">
+            <a:avLst/>
+          </a:prstGeom>
+          <a:ln>
+            <a:tailEnd type="triangle"/>
+          </a:ln>
+        </p:spPr>
+        <p:style>
+          <a:lnRef idx="1">
+            <a:schemeClr val="accent3"/>
+          </a:lnRef>
+          <a:fillRef idx="0">
+            <a:schemeClr val="accent3"/>
+          </a:fillRef>
+          <a:effectRef idx="0">
+            <a:schemeClr val="accent3"/>
+          </a:effectRef>
+          <a:fontRef idx="minor">
+            <a:schemeClr val="tx1"/>
+          </a:fontRef>
+        </p:style>
+      </p:cxnSp>
+      <p:cxnSp>
+        <p:nvCxnSpPr>
+          <p:cNvPr id="57" name="Straight Arrow Connector 56">
+            <a:extLst>
+              <a:ext uri="{FF2B5EF4-FFF2-40B4-BE49-F238E27FC236}">
+                <a16:creationId xmlns:a16="http://schemas.microsoft.com/office/drawing/2014/main" id="{E4F1B164-6110-4AD8-BBAA-0C79EF96F6AE}"/>
+              </a:ext>
+            </a:extLst>
+          </p:cNvPr>
+          <p:cNvCxnSpPr>
+            <a:endCxn id="5" idx="0"/>
+          </p:cNvCxnSpPr>
+          <p:nvPr/>
+        </p:nvCxnSpPr>
+        <p:spPr>
+          <a:xfrm flipH="1">
+            <a:off x="1251036" y="3224265"/>
+            <a:ext cx="4369915" cy="813835"/>
+          </a:xfrm>
+          <a:prstGeom prst="straightConnector1">
+            <a:avLst/>
+          </a:prstGeom>
+          <a:ln>
+            <a:tailEnd type="triangle"/>
+          </a:ln>
+        </p:spPr>
+        <p:style>
+          <a:lnRef idx="1">
+            <a:schemeClr val="accent1"/>
+          </a:lnRef>
+          <a:fillRef idx="0">
+            <a:schemeClr val="accent1"/>
+          </a:fillRef>
+          <a:effectRef idx="0">
+            <a:schemeClr val="accent1"/>
+          </a:effectRef>
+          <a:fontRef idx="minor">
+            <a:schemeClr val="tx1"/>
+          </a:fontRef>
+        </p:style>
+      </p:cxnSp>
     </p:spTree>
     <p:extLst>
       <p:ext uri="{BB962C8B-B14F-4D97-AF65-F5344CB8AC3E}">
-        <p14:creationId xmlns:p14="http://schemas.microsoft.com/office/powerpoint/2010/main" val="3340501789"/>
+        <p14:creationId xmlns:p14="http://schemas.microsoft.com/office/powerpoint/2010/main" val="2217180221"/>
       </p:ext>
     </p:extLst>
   </p:cSld>
@@ -9014,16 +11016,46 @@
           <a:p>
             <a:r>
               <a:rPr lang="en-US" dirty="0"/>
-              <a:t>                 Knuth Policy</a:t>
+              <a:t>               Knuth Strategy tree example </a:t>
             </a:r>
             <a:endParaRPr lang="en-US" sz="4000" dirty="0"/>
           </a:p>
         </p:txBody>
       </p:sp>
+      <p:pic>
+        <p:nvPicPr>
+          <p:cNvPr id="7" name="Picture 6">
+            <a:extLst>
+              <a:ext uri="{FF2B5EF4-FFF2-40B4-BE49-F238E27FC236}">
+                <a16:creationId xmlns:a16="http://schemas.microsoft.com/office/drawing/2014/main" id="{D5DA528D-FD17-482B-ACD4-F26307AEE446}"/>
+              </a:ext>
+            </a:extLst>
+          </p:cNvPr>
+          <p:cNvPicPr>
+            <a:picLocks noChangeAspect="1"/>
+          </p:cNvPicPr>
+          <p:nvPr/>
+        </p:nvPicPr>
+        <p:blipFill>
+          <a:blip r:embed="rId2"/>
+          <a:stretch>
+            <a:fillRect/>
+          </a:stretch>
+        </p:blipFill>
+        <p:spPr>
+          <a:xfrm>
+            <a:off x="646111" y="1486630"/>
+            <a:ext cx="10442408" cy="5095240"/>
+          </a:xfrm>
+          <a:prstGeom prst="rect">
+            <a:avLst/>
+          </a:prstGeom>
+        </p:spPr>
+      </p:pic>
     </p:spTree>
     <p:extLst>
       <p:ext uri="{BB962C8B-B14F-4D97-AF65-F5344CB8AC3E}">
-        <p14:creationId xmlns:p14="http://schemas.microsoft.com/office/powerpoint/2010/main" val="3878764774"/>
+        <p14:creationId xmlns:p14="http://schemas.microsoft.com/office/powerpoint/2010/main" val="675660116"/>
       </p:ext>
     </p:extLst>
   </p:cSld>
@@ -9180,16 +11212,117 @@
           <a:p>
             <a:r>
               <a:rPr lang="en-US" dirty="0"/>
-              <a:t>                 Our NN Policy</a:t>
+              <a:t>                 Random  Policy</a:t>
             </a:r>
             <a:endParaRPr lang="en-US" sz="4000" dirty="0"/>
+          </a:p>
+        </p:txBody>
+      </p:sp>
+      <p:sp>
+        <p:nvSpPr>
+          <p:cNvPr id="3" name="TextBox 2">
+            <a:extLst>
+              <a:ext uri="{FF2B5EF4-FFF2-40B4-BE49-F238E27FC236}">
+                <a16:creationId xmlns:a16="http://schemas.microsoft.com/office/drawing/2014/main" id="{07BF8C91-2E5D-4EFE-983E-424C75309229}"/>
+              </a:ext>
+            </a:extLst>
+          </p:cNvPr>
+          <p:cNvSpPr txBox="1"/>
+          <p:nvPr/>
+        </p:nvSpPr>
+        <p:spPr>
+          <a:xfrm>
+            <a:off x="581159" y="1152983"/>
+            <a:ext cx="9778323" cy="3970318"/>
+          </a:xfrm>
+          <a:prstGeom prst="rect">
+            <a:avLst/>
+          </a:prstGeom>
+          <a:noFill/>
+        </p:spPr>
+        <p:txBody>
+          <a:bodyPr wrap="square" rtlCol="0">
+            <a:spAutoFit/>
+          </a:bodyPr>
+          <a:lstStyle/>
+          <a:p>
+            <a:pPr marL="342900" indent="-342900">
+              <a:buAutoNum type="arabicParenR"/>
+            </a:pPr>
+            <a:r>
+              <a:rPr lang="en-US" dirty="0"/>
+              <a:t>Pick a guess randomly from the list of qualifying candidates</a:t>
+            </a:r>
+          </a:p>
+          <a:p>
+            <a:pPr marL="342900" indent="-342900">
+              <a:buAutoNum type="arabicParenR"/>
+            </a:pPr>
+            <a:r>
+              <a:rPr lang="en-US" dirty="0"/>
+              <a:t>If winning guess  quit  </a:t>
+            </a:r>
+          </a:p>
+          <a:p>
+            <a:r>
+              <a:rPr lang="en-US" dirty="0"/>
+              <a:t>2)  Based on the response, filters out the candidate list </a:t>
+            </a:r>
+          </a:p>
+          <a:p>
+            <a:pPr marL="342900" indent="-342900">
+              <a:buAutoNum type="arabicParenR" startAt="3"/>
+            </a:pPr>
+            <a:r>
+              <a:rPr lang="en-US" dirty="0"/>
+              <a:t>Go to 1)</a:t>
+            </a:r>
+          </a:p>
+          <a:p>
+            <a:pPr marL="342900" indent="-342900">
+              <a:buAutoNum type="arabicParenR" startAt="3"/>
+            </a:pPr>
+            <a:endParaRPr lang="en-US" dirty="0"/>
+          </a:p>
+          <a:p>
+            <a:endParaRPr lang="en-US" dirty="0"/>
+          </a:p>
+          <a:p>
+            <a:r>
+              <a:rPr lang="en-US" dirty="0"/>
+              <a:t>Advantage : Execution time is extremely fast so many strategy trees can be built and evaluated in a unit of time keeping the one that gives the best result  </a:t>
+            </a:r>
+          </a:p>
+          <a:p>
+            <a:endParaRPr lang="en-US" dirty="0"/>
+          </a:p>
+          <a:p>
+            <a:endParaRPr lang="en-US" dirty="0"/>
+          </a:p>
+          <a:p>
+            <a:endParaRPr lang="en-US" dirty="0"/>
+          </a:p>
+          <a:p>
+            <a:endParaRPr lang="en-US" dirty="0"/>
+          </a:p>
+          <a:p>
+            <a:r>
+              <a:rPr lang="en-US" dirty="0"/>
+              <a:t>         TODO – put a graph of number of iteration and the result </a:t>
+            </a:r>
+          </a:p>
+          <a:p>
+            <a:r>
+              <a:rPr lang="en-US" dirty="0"/>
+              <a:t> </a:t>
+            </a:r>
           </a:p>
         </p:txBody>
       </p:sp>
     </p:spTree>
     <p:extLst>
       <p:ext uri="{BB962C8B-B14F-4D97-AF65-F5344CB8AC3E}">
-        <p14:creationId xmlns:p14="http://schemas.microsoft.com/office/powerpoint/2010/main" val="2955002984"/>
+        <p14:creationId xmlns:p14="http://schemas.microsoft.com/office/powerpoint/2010/main" val="2374018576"/>
       </p:ext>
     </p:extLst>
   </p:cSld>

</xml_diff>

<commit_message>
add graph of random strategy
</commit_message>
<xml_diff>
--- a/ai_final_project_mastermind.pptx
+++ b/ai_final_project_mastermind.pptx
@@ -8746,7 +8746,7 @@
           <a:p>
             <a:r>
               <a:rPr lang="en-US" dirty="0"/>
-              <a:t>           Training the NN – MTCS approach   </a:t>
+              <a:t>           Training the NN – MCTS approach   </a:t>
             </a:r>
             <a:endParaRPr lang="en-US" sz="4000" dirty="0"/>
           </a:p>
@@ -8828,7 +8828,7 @@
         <p:spPr>
           <a:xfrm>
             <a:off x="194345" y="1253083"/>
-            <a:ext cx="11641256" cy="2585323"/>
+            <a:ext cx="11641256" cy="4247317"/>
           </a:xfrm>
           <a:prstGeom prst="rect">
             <a:avLst/>
@@ -8843,7 +8843,7 @@
           <a:p>
             <a:r>
               <a:rPr lang="en-US" dirty="0"/>
-              <a:t>Inspired by MTCS we initially generated  games episodes using the random play strategy. </a:t>
+              <a:t>Inspired by MTCS, we initially generated  games episodes using the random play strategy. </a:t>
             </a:r>
           </a:p>
           <a:p>
@@ -8865,10 +8865,338 @@
             <a:endParaRPr lang="en-US" dirty="0"/>
           </a:p>
           <a:p>
+            <a:r>
+              <a:rPr lang="en-US" dirty="0"/>
+              <a:t>After the NN was trained with initial data – we started playing games with it and its output was used as more training examples to train the network again and again.</a:t>
+            </a:r>
+          </a:p>
+          <a:p>
             <a:endParaRPr lang="en-US" dirty="0"/>
           </a:p>
           <a:p>
             <a:endParaRPr lang="en-US" dirty="0"/>
+          </a:p>
+          <a:p>
+            <a:endParaRPr lang="en-US" dirty="0"/>
+          </a:p>
+          <a:p>
+            <a:endParaRPr lang="en-US" dirty="0"/>
+          </a:p>
+          <a:p>
+            <a:endParaRPr lang="en-US" dirty="0"/>
+          </a:p>
+          <a:p>
+            <a:endParaRPr lang="en-US" dirty="0"/>
+          </a:p>
+        </p:txBody>
+      </p:sp>
+      <p:sp>
+        <p:nvSpPr>
+          <p:cNvPr id="8" name="Rectangle 7">
+            <a:extLst>
+              <a:ext uri="{FF2B5EF4-FFF2-40B4-BE49-F238E27FC236}">
+                <a16:creationId xmlns:a16="http://schemas.microsoft.com/office/drawing/2014/main" id="{8A80D4D7-83E3-4E78-A284-5CAF73539157}"/>
+              </a:ext>
+            </a:extLst>
+          </p:cNvPr>
+          <p:cNvSpPr/>
+          <p:nvPr/>
+        </p:nvSpPr>
+        <p:spPr>
+          <a:xfrm>
+            <a:off x="482825" y="4213514"/>
+            <a:ext cx="1465718" cy="1233200"/>
+          </a:xfrm>
+          <a:prstGeom prst="rect">
+            <a:avLst/>
+          </a:prstGeom>
+        </p:spPr>
+        <p:style>
+          <a:lnRef idx="2">
+            <a:schemeClr val="accent1">
+              <a:shade val="50000"/>
+            </a:schemeClr>
+          </a:lnRef>
+          <a:fillRef idx="1">
+            <a:schemeClr val="accent1"/>
+          </a:fillRef>
+          <a:effectRef idx="0">
+            <a:schemeClr val="accent1"/>
+          </a:effectRef>
+          <a:fontRef idx="minor">
+            <a:schemeClr val="lt1"/>
+          </a:fontRef>
+        </p:style>
+        <p:txBody>
+          <a:bodyPr rtlCol="0" anchor="ctr"/>
+          <a:lstStyle/>
+          <a:p>
+            <a:pPr algn="ctr"/>
+            <a:r>
+              <a:rPr lang="en-US" dirty="0"/>
+              <a:t>Episodes from Random strategy </a:t>
+            </a:r>
+          </a:p>
+        </p:txBody>
+      </p:sp>
+      <p:sp>
+        <p:nvSpPr>
+          <p:cNvPr id="14" name="Arrow: Right 13">
+            <a:extLst>
+              <a:ext uri="{FF2B5EF4-FFF2-40B4-BE49-F238E27FC236}">
+                <a16:creationId xmlns:a16="http://schemas.microsoft.com/office/drawing/2014/main" id="{D06C5AF8-E59F-42EE-BE9E-57F82A4E6CE7}"/>
+              </a:ext>
+            </a:extLst>
+          </p:cNvPr>
+          <p:cNvSpPr/>
+          <p:nvPr/>
+        </p:nvSpPr>
+        <p:spPr>
+          <a:xfrm>
+            <a:off x="1948542" y="4673731"/>
+            <a:ext cx="1719943" cy="269000"/>
+          </a:xfrm>
+          <a:prstGeom prst="rightArrow">
+            <a:avLst/>
+          </a:prstGeom>
+        </p:spPr>
+        <p:style>
+          <a:lnRef idx="2">
+            <a:schemeClr val="accent1">
+              <a:shade val="50000"/>
+            </a:schemeClr>
+          </a:lnRef>
+          <a:fillRef idx="1">
+            <a:schemeClr val="accent1"/>
+          </a:fillRef>
+          <a:effectRef idx="0">
+            <a:schemeClr val="accent1"/>
+          </a:effectRef>
+          <a:fontRef idx="minor">
+            <a:schemeClr val="lt1"/>
+          </a:fontRef>
+        </p:style>
+        <p:txBody>
+          <a:bodyPr rtlCol="0" anchor="ctr"/>
+          <a:lstStyle/>
+          <a:p>
+            <a:pPr algn="ctr"/>
+            <a:endParaRPr lang="en-US" dirty="0"/>
+          </a:p>
+        </p:txBody>
+      </p:sp>
+      <p:sp>
+        <p:nvSpPr>
+          <p:cNvPr id="18" name="TextBox 17">
+            <a:extLst>
+              <a:ext uri="{FF2B5EF4-FFF2-40B4-BE49-F238E27FC236}">
+                <a16:creationId xmlns:a16="http://schemas.microsoft.com/office/drawing/2014/main" id="{1A4E6302-01DF-44C7-8125-DF1D4F3A5021}"/>
+              </a:ext>
+            </a:extLst>
+          </p:cNvPr>
+          <p:cNvSpPr txBox="1"/>
+          <p:nvPr/>
+        </p:nvSpPr>
+        <p:spPr>
+          <a:xfrm>
+            <a:off x="2026758" y="4027400"/>
+            <a:ext cx="1641728" cy="646331"/>
+          </a:xfrm>
+          <a:prstGeom prst="rect">
+            <a:avLst/>
+          </a:prstGeom>
+          <a:noFill/>
+        </p:spPr>
+        <p:txBody>
+          <a:bodyPr wrap="square" rtlCol="0">
+            <a:spAutoFit/>
+          </a:bodyPr>
+          <a:lstStyle/>
+          <a:p>
+            <a:r>
+              <a:rPr lang="en-US" dirty="0"/>
+              <a:t>Training examples </a:t>
+            </a:r>
+          </a:p>
+        </p:txBody>
+      </p:sp>
+      <p:sp>
+        <p:nvSpPr>
+          <p:cNvPr id="19" name="Rectangle 18">
+            <a:extLst>
+              <a:ext uri="{FF2B5EF4-FFF2-40B4-BE49-F238E27FC236}">
+                <a16:creationId xmlns:a16="http://schemas.microsoft.com/office/drawing/2014/main" id="{A57C5296-6F9A-43B0-AE57-F0700F083567}"/>
+              </a:ext>
+            </a:extLst>
+          </p:cNvPr>
+          <p:cNvSpPr/>
+          <p:nvPr/>
+        </p:nvSpPr>
+        <p:spPr>
+          <a:xfrm>
+            <a:off x="3668485" y="4224028"/>
+            <a:ext cx="1641728" cy="1233200"/>
+          </a:xfrm>
+          <a:prstGeom prst="rect">
+            <a:avLst/>
+          </a:prstGeom>
+        </p:spPr>
+        <p:style>
+          <a:lnRef idx="2">
+            <a:schemeClr val="accent4">
+              <a:shade val="50000"/>
+            </a:schemeClr>
+          </a:lnRef>
+          <a:fillRef idx="1">
+            <a:schemeClr val="accent4"/>
+          </a:fillRef>
+          <a:effectRef idx="0">
+            <a:schemeClr val="accent4"/>
+          </a:effectRef>
+          <a:fontRef idx="minor">
+            <a:schemeClr val="lt1"/>
+          </a:fontRef>
+        </p:style>
+        <p:txBody>
+          <a:bodyPr rtlCol="0" anchor="ctr"/>
+          <a:lstStyle/>
+          <a:p>
+            <a:pPr algn="ctr"/>
+            <a:r>
+              <a:rPr lang="en-US" dirty="0"/>
+              <a:t>NN Strategy </a:t>
+            </a:r>
+          </a:p>
+        </p:txBody>
+      </p:sp>
+      <p:sp>
+        <p:nvSpPr>
+          <p:cNvPr id="21" name="Arrow: Right 20">
+            <a:extLst>
+              <a:ext uri="{FF2B5EF4-FFF2-40B4-BE49-F238E27FC236}">
+                <a16:creationId xmlns:a16="http://schemas.microsoft.com/office/drawing/2014/main" id="{BCE02FAC-36B0-4D22-9284-D1896CDCE22C}"/>
+              </a:ext>
+            </a:extLst>
+          </p:cNvPr>
+          <p:cNvSpPr/>
+          <p:nvPr/>
+        </p:nvSpPr>
+        <p:spPr>
+          <a:xfrm>
+            <a:off x="5310213" y="4706128"/>
+            <a:ext cx="1719943" cy="269000"/>
+          </a:xfrm>
+          <a:prstGeom prst="rightArrow">
+            <a:avLst/>
+          </a:prstGeom>
+        </p:spPr>
+        <p:style>
+          <a:lnRef idx="2">
+            <a:schemeClr val="accent1">
+              <a:shade val="50000"/>
+            </a:schemeClr>
+          </a:lnRef>
+          <a:fillRef idx="1">
+            <a:schemeClr val="accent1"/>
+          </a:fillRef>
+          <a:effectRef idx="0">
+            <a:schemeClr val="accent1"/>
+          </a:effectRef>
+          <a:fontRef idx="minor">
+            <a:schemeClr val="lt1"/>
+          </a:fontRef>
+        </p:style>
+        <p:txBody>
+          <a:bodyPr rtlCol="0" anchor="ctr"/>
+          <a:lstStyle/>
+          <a:p>
+            <a:pPr algn="ctr"/>
+            <a:endParaRPr lang="en-US" dirty="0"/>
+          </a:p>
+        </p:txBody>
+      </p:sp>
+      <p:sp>
+        <p:nvSpPr>
+          <p:cNvPr id="22" name="TextBox 21">
+            <a:extLst>
+              <a:ext uri="{FF2B5EF4-FFF2-40B4-BE49-F238E27FC236}">
+                <a16:creationId xmlns:a16="http://schemas.microsoft.com/office/drawing/2014/main" id="{EE8C8B44-B27C-4DC9-88D7-74988FEAC275}"/>
+              </a:ext>
+            </a:extLst>
+          </p:cNvPr>
+          <p:cNvSpPr txBox="1"/>
+          <p:nvPr/>
+        </p:nvSpPr>
+        <p:spPr>
+          <a:xfrm>
+            <a:off x="5424698" y="4141913"/>
+            <a:ext cx="2216226" cy="646331"/>
+          </a:xfrm>
+          <a:prstGeom prst="rect">
+            <a:avLst/>
+          </a:prstGeom>
+          <a:noFill/>
+        </p:spPr>
+        <p:txBody>
+          <a:bodyPr wrap="square" rtlCol="0">
+            <a:spAutoFit/>
+          </a:bodyPr>
+          <a:lstStyle/>
+          <a:p>
+            <a:r>
+              <a:rPr lang="en-US" dirty="0"/>
+              <a:t>More training examples </a:t>
+            </a:r>
+          </a:p>
+        </p:txBody>
+      </p:sp>
+      <p:sp>
+        <p:nvSpPr>
+          <p:cNvPr id="2048" name="Arrow: Curved Left 2047">
+            <a:extLst>
+              <a:ext uri="{FF2B5EF4-FFF2-40B4-BE49-F238E27FC236}">
+                <a16:creationId xmlns:a16="http://schemas.microsoft.com/office/drawing/2014/main" id="{D94254CB-0044-4683-AA65-9DE2B0C97B3D}"/>
+              </a:ext>
+            </a:extLst>
+          </p:cNvPr>
+          <p:cNvSpPr/>
+          <p:nvPr/>
+        </p:nvSpPr>
+        <p:spPr>
+          <a:xfrm rot="5400000">
+            <a:off x="4526441" y="3224805"/>
+            <a:ext cx="1027288" cy="4463144"/>
+          </a:xfrm>
+          <a:prstGeom prst="curvedLeftArrow">
+            <a:avLst/>
+          </a:prstGeom>
+        </p:spPr>
+        <p:style>
+          <a:lnRef idx="2">
+            <a:schemeClr val="accent1">
+              <a:shade val="50000"/>
+            </a:schemeClr>
+          </a:lnRef>
+          <a:fillRef idx="1">
+            <a:schemeClr val="accent1"/>
+          </a:fillRef>
+          <a:effectRef idx="0">
+            <a:schemeClr val="accent1"/>
+          </a:effectRef>
+          <a:fontRef idx="minor">
+            <a:schemeClr val="lt1"/>
+          </a:fontRef>
+        </p:style>
+        <p:txBody>
+          <a:bodyPr rtlCol="0" anchor="ctr"/>
+          <a:lstStyle/>
+          <a:p>
+            <a:pPr algn="ctr"/>
+            <a:endParaRPr lang="en-US">
+              <a:solidFill>
+                <a:schemeClr val="tx1"/>
+              </a:solidFill>
+            </a:endParaRPr>
           </a:p>
         </p:txBody>
       </p:sp>

</xml_diff>

<commit_message>
More changes to presentation 2
</commit_message>
<xml_diff>
--- a/ai_final_project_mastermind.pptx
+++ b/ai_final_project_mastermind.pptx
@@ -35711,8 +35711,19 @@
           <a:p>
             <a:r>
               <a:rPr lang="en-US" dirty="0"/>
-              <a:t>4. The simulator simulates games against all secret codes and generates the score for the policy (average guesses to win)</a:t>
+              <a:t>4. The simulator simulates games against all </a:t>
             </a:r>
+            <a:r>
+              <a:rPr lang="en-US" sz="1200" dirty="0"/>
+              <a:t>1296 </a:t>
+            </a:r>
+            <a:r>
+              <a:rPr lang="en-US" dirty="0"/>
+              <a:t>secret codes and generates the score for the policy (average guesses to win) </a:t>
+            </a:r>
+          </a:p>
+          <a:p>
+            <a:endParaRPr lang="en-US" dirty="0"/>
           </a:p>
           <a:p>
             <a:endParaRPr lang="en-US" dirty="0"/>
@@ -43182,7 +43193,7 @@
         <p:spPr>
           <a:xfrm>
             <a:off x="488913" y="1445594"/>
-            <a:ext cx="11408677" cy="5262979"/>
+            <a:ext cx="11408677" cy="4893647"/>
           </a:xfrm>
           <a:prstGeom prst="rect">
             <a:avLst/>
@@ -43194,8 +43205,9 @@
           </a:bodyPr>
           <a:lstStyle/>
           <a:p>
-            <a:pPr marL="342900" indent="-342900">
-              <a:buAutoNum type="arabicParenR"/>
+            <a:pPr marL="457200" indent="-457200">
+              <a:buFont typeface="+mj-lt"/>
+              <a:buAutoNum type="arabicPeriod"/>
             </a:pPr>
             <a:r>
               <a:rPr lang="en-US" sz="2400" dirty="0"/>
@@ -43203,8 +43215,9 @@
             </a:r>
           </a:p>
           <a:p>
-            <a:pPr marL="342900" indent="-342900">
-              <a:buAutoNum type="arabicParenR"/>
+            <a:pPr marL="457200" indent="-457200">
+              <a:buFont typeface="+mj-lt"/>
+              <a:buAutoNum type="arabicPeriod"/>
             </a:pPr>
             <a:r>
               <a:rPr lang="en-US" sz="2400" dirty="0"/>
@@ -43212,8 +43225,9 @@
             </a:r>
           </a:p>
           <a:p>
-            <a:pPr marL="342900" indent="-342900">
-              <a:buAutoNum type="arabicParenR"/>
+            <a:pPr marL="457200" indent="-457200">
+              <a:buFont typeface="+mj-lt"/>
+              <a:buAutoNum type="arabicPeriod"/>
             </a:pPr>
             <a:r>
               <a:rPr lang="en-US" sz="2400" dirty="0"/>
@@ -43221,14 +43235,19 @@
             </a:r>
           </a:p>
           <a:p>
+            <a:pPr marL="457200" indent="-457200">
+              <a:buFont typeface="+mj-lt"/>
+              <a:buAutoNum type="arabicPeriod"/>
+            </a:pPr>
             <a:r>
               <a:rPr lang="en-US" sz="2400" dirty="0"/>
-              <a:t>2) Filter out the candidates list based on the response.</a:t>
+              <a:t>Filter out the candidates list based on the response.</a:t>
             </a:r>
           </a:p>
           <a:p>
-            <a:pPr marL="342900" indent="-342900">
-              <a:buAutoNum type="arabicParenR" startAt="3"/>
+            <a:pPr marL="457200" indent="-457200">
+              <a:buFont typeface="+mj-lt"/>
+              <a:buAutoNum type="arabicPeriod"/>
             </a:pPr>
             <a:r>
               <a:rPr lang="en-US" sz="2400" dirty="0"/>
@@ -43237,36 +43256,26 @@
           </a:p>
           <a:p>
             <a:pPr marL="342900" indent="-342900">
-              <a:buAutoNum type="arabicParenR" startAt="3"/>
+              <a:buAutoNum type="arabicPeriod"/>
             </a:pPr>
             <a:endParaRPr lang="en-US" sz="2400" dirty="0"/>
           </a:p>
           <a:p>
             <a:r>
               <a:rPr lang="en-US" sz="2400" b="1" dirty="0"/>
-              <a:t>Worst-case scoring algorithm</a:t>
+              <a:t>Worst-case scoring algorithm:</a:t>
             </a:r>
           </a:p>
           <a:p>
             <a:r>
               <a:rPr lang="en-US" sz="2400" dirty="0"/>
-              <a:t>For the guess under evaluation:</a:t>
-            </a:r>
-          </a:p>
-          <a:p>
-            <a:pPr marL="457200" indent="-457200">
-              <a:buFont typeface="+mj-lt"/>
-              <a:buAutoNum type="arabicParenR"/>
-            </a:pPr>
-            <a:r>
-              <a:rPr lang="en-US" sz="2400" dirty="0"/>
-              <a:t>Compute all the different 15  lists of qualifying candidates, one for each possible response, from the existing list of qualifying candidates. </a:t>
+              <a:t>For each guess, compute the 15 lists of qualifying candidates (one for each possible response) from the existing candidate list. </a:t>
             </a:r>
           </a:p>
           <a:p>
             <a:r>
               <a:rPr lang="en-US" sz="2400" dirty="0"/>
-              <a:t>The length of the </a:t>
+              <a:t>Length of </a:t>
             </a:r>
             <a:r>
               <a:rPr lang="en-US" sz="2400" b="1" dirty="0"/>
@@ -43274,7 +43283,7 @@
             </a:r>
             <a:r>
               <a:rPr lang="en-US" sz="2400" dirty="0"/>
-              <a:t> list is the score of the guess.</a:t>
+              <a:t> list = score of the guess.</a:t>
             </a:r>
           </a:p>
           <a:p>
@@ -43358,35 +43367,55 @@
         </p:nvSpPr>
         <p:spPr>
           <a:xfrm>
-            <a:off x="646112" y="2052918"/>
-            <a:ext cx="9403742" cy="4195481"/>
+            <a:off x="647091" y="1635474"/>
+            <a:ext cx="11379257" cy="4195481"/>
           </a:xfrm>
         </p:spPr>
         <p:txBody>
-          <a:bodyPr/>
+          <a:bodyPr>
+            <a:normAutofit/>
+          </a:bodyPr>
           <a:lstStyle/>
           <a:p>
             <a:pPr marL="0" indent="0">
               <a:buNone/>
             </a:pPr>
             <a:r>
-              <a:rPr lang="en-US" dirty="0"/>
-              <a:t>Building a strategy tree out of Knuth  policy takes a while but it yields right a way a good result of 4.476  guesses on average to win. Shuffling the full list of guesses  randomly and rerunning it repeatedly  ,capturing the best result, yields  </a:t>
-            </a:r>
-            <a:r>
-              <a:rPr lang="en-US" b="1" dirty="0"/>
-              <a:t>4.451</a:t>
-            </a:r>
-            <a:r>
-              <a:rPr lang="en-US" dirty="0"/>
-              <a:t> average guesses as the best result</a:t>
+              <a:rPr lang="en-US" sz="2400" dirty="0"/>
+              <a:t>Building a strategy tree out of Knuth policy is time intensive</a:t>
             </a:r>
           </a:p>
           <a:p>
             <a:pPr marL="0" indent="0">
               <a:buNone/>
             </a:pPr>
-            <a:endParaRPr lang="en-US" dirty="0"/>
+            <a:r>
+              <a:rPr lang="en-US" sz="2400" dirty="0"/>
+              <a:t>Achieves 4.476  guess average relatively quickly</a:t>
+            </a:r>
+          </a:p>
+          <a:p>
+            <a:pPr marL="0" indent="0">
+              <a:buNone/>
+            </a:pPr>
+            <a:r>
+              <a:rPr lang="en-US" sz="2400" dirty="0"/>
+              <a:t>Shuffling list of guesses and rerunning repeatedly yields </a:t>
+            </a:r>
+            <a:r>
+              <a:rPr lang="en-US" sz="2400" b="1" dirty="0"/>
+              <a:t>4.451</a:t>
+            </a:r>
+            <a:r>
+              <a:rPr lang="en-US" sz="2400" dirty="0"/>
+              <a:t> guess average</a:t>
+            </a:r>
+          </a:p>
+          <a:p>
+            <a:pPr marL="0" indent="0">
+              <a:buNone/>
+            </a:pPr>
+            <a:endParaRPr lang="en-US" sz="2400" dirty="0"/>
           </a:p>
         </p:txBody>
       </p:sp>
@@ -43405,14 +43434,14 @@
           <p:nvPr>
             <p:extLst>
               <p:ext uri="{D42A27DB-BD31-4B8C-83A1-F6EECF244321}">
-                <p14:modId xmlns:p14="http://schemas.microsoft.com/office/powerpoint/2010/main" val="2912805526"/>
+                <p14:modId xmlns:p14="http://schemas.microsoft.com/office/powerpoint/2010/main" val="306503530"/>
               </p:ext>
             </p:extLst>
           </p:nvPr>
         </p:nvGraphicFramePr>
         <p:xfrm>
-          <a:off x="1023798" y="4071256"/>
-          <a:ext cx="10021243" cy="2177143"/>
+          <a:off x="2535036" y="3419060"/>
+          <a:ext cx="7126289" cy="3047999"/>
         </p:xfrm>
         <a:graphic>
           <a:graphicData uri="http://schemas.openxmlformats.org/drawingml/2006/chart">
@@ -47442,7 +47471,7 @@
         <p:spPr>
           <a:xfrm>
             <a:off x="489097" y="1532900"/>
-            <a:ext cx="11121655" cy="2677656"/>
+            <a:ext cx="11121655" cy="1938992"/>
           </a:xfrm>
           <a:prstGeom prst="rect">
             <a:avLst/>
@@ -47455,30 +47484,23 @@
           </a:bodyPr>
           <a:lstStyle/>
           <a:p>
-            <a:pPr marL="342900" indent="-342900">
-              <a:buFont typeface="Arial" panose="020B0604020202020204" pitchFamily="34" charset="0"/>
-              <a:buChar char="•"/>
+            <a:pPr marL="457200" indent="-457200">
+              <a:buFont typeface="+mj-lt"/>
+              <a:buAutoNum type="arabicPeriod"/>
             </a:pPr>
             <a:r>
               <a:rPr lang="en-US" sz="2400" dirty="0"/>
-              <a:t>Write a python program that learns a mastermind playing policy that is competitive with existing policies and better than a naïve playing policy</a:t>
+              <a:t>Create a Mastermind playing policy that is competitive with existing policies and better than a naïve playing policy</a:t>
             </a:r>
           </a:p>
           <a:p>
-            <a:pPr marL="342900" indent="-342900">
-              <a:buFont typeface="Arial" panose="020B0604020202020204" pitchFamily="34" charset="0"/>
-              <a:buChar char="•"/>
-            </a:pPr>
-            <a:endParaRPr lang="en-US" sz="2400" dirty="0"/>
-          </a:p>
-          <a:p>
-            <a:pPr marL="342900" indent="-342900">
-              <a:buFont typeface="Arial" panose="020B0604020202020204" pitchFamily="34" charset="0"/>
-              <a:buChar char="•"/>
+            <a:pPr marL="457200" indent="-457200">
+              <a:buFont typeface="+mj-lt"/>
+              <a:buAutoNum type="arabicPeriod"/>
             </a:pPr>
             <a:r>
               <a:rPr lang="en-US" sz="2400" dirty="0"/>
-              <a:t>Build a generic framework to evaluate any arbitrary mastermind policy   </a:t>
+              <a:t>Build a generic framework to evaluate any Mastermind policy   </a:t>
             </a:r>
           </a:p>
           <a:p>
@@ -47994,7 +48016,7 @@
         <p:spPr>
           <a:xfrm>
             <a:off x="388690" y="1495547"/>
-            <a:ext cx="10711701" cy="5262979"/>
+            <a:ext cx="10711701" cy="3416320"/>
           </a:xfrm>
           <a:prstGeom prst="rect">
             <a:avLst/>
@@ -48063,40 +48085,6 @@
               <a:rPr lang="en-US" sz="2400" dirty="0"/>
               <a:t>} is.</a:t>
             </a:r>
-          </a:p>
-          <a:p>
-            <a:pPr marL="342900" indent="-342900">
-              <a:buFont typeface="Arial" panose="020B0604020202020204" pitchFamily="34" charset="0"/>
-              <a:buChar char="•"/>
-            </a:pPr>
-            <a:endParaRPr lang="en-US" sz="2400" dirty="0"/>
-          </a:p>
-          <a:p>
-            <a:pPr marL="342900" indent="-342900">
-              <a:buFont typeface="Arial" panose="020B0604020202020204" pitchFamily="34" charset="0"/>
-              <a:buChar char="•"/>
-            </a:pPr>
-            <a:r>
-              <a:rPr lang="en-US" sz="2400" dirty="0"/>
-              <a:t>Evaluated by simulating it playing against all 1296 possible secret codes</a:t>
-            </a:r>
-          </a:p>
-          <a:p>
-            <a:pPr marL="342900" indent="-342900">
-              <a:buFont typeface="Arial" panose="020B0604020202020204" pitchFamily="34" charset="0"/>
-              <a:buChar char="•"/>
-            </a:pPr>
-            <a:r>
-              <a:rPr lang="en-US" sz="2400" dirty="0"/>
-              <a:t>   </a:t>
-            </a:r>
-          </a:p>
-          <a:p>
-            <a:pPr marL="342900" indent="-342900">
-              <a:buFont typeface="Arial" panose="020B0604020202020204" pitchFamily="34" charset="0"/>
-              <a:buChar char="•"/>
-            </a:pPr>
-            <a:endParaRPr lang="en-US" sz="2400" dirty="0"/>
           </a:p>
           <a:p>
             <a:pPr marL="342900" indent="-342900">
@@ -50294,36 +50282,43 @@
           </a:bodyPr>
           <a:lstStyle/>
           <a:p>
-            <a:pPr marL="342900" indent="-342900">
-              <a:buAutoNum type="arabicParenR"/>
+            <a:pPr marL="457200" indent="-457200">
+              <a:buFont typeface="+mj-lt"/>
+              <a:buAutoNum type="arabicPeriod"/>
             </a:pPr>
             <a:r>
               <a:rPr lang="en-US" sz="2400" dirty="0"/>
-              <a:t>Pick a guess randomly from the list of qualifying candidates</a:t>
+              <a:t>Pick a guess randomly from the list of qualifying candidates.</a:t>
             </a:r>
           </a:p>
           <a:p>
-            <a:pPr marL="342900" indent="-342900">
-              <a:buAutoNum type="arabicParenR"/>
+            <a:pPr marL="457200" indent="-457200">
+              <a:buFont typeface="+mj-lt"/>
+              <a:buAutoNum type="arabicPeriod"/>
             </a:pPr>
             <a:r>
               <a:rPr lang="en-US" sz="2400" dirty="0"/>
-              <a:t>If it is a winning guess, quit  </a:t>
+              <a:t>If it is a winning guess, quit.</a:t>
             </a:r>
           </a:p>
           <a:p>
+            <a:pPr marL="457200" indent="-457200">
+              <a:buFont typeface="+mj-lt"/>
+              <a:buAutoNum type="arabicPeriod"/>
+            </a:pPr>
             <a:r>
               <a:rPr lang="en-US" sz="2400" dirty="0"/>
-              <a:t>2) Based on the response, filters out the candidate list </a:t>
+              <a:t>Based on the response, filters out the candidate list.</a:t>
             </a:r>
           </a:p>
           <a:p>
-            <a:pPr marL="342900" indent="-342900">
-              <a:buAutoNum type="arabicParenR" startAt="3"/>
+            <a:pPr marL="457200" indent="-457200">
+              <a:buFont typeface="+mj-lt"/>
+              <a:buAutoNum type="arabicPeriod"/>
             </a:pPr>
             <a:r>
               <a:rPr lang="en-US" sz="2400" dirty="0"/>
-              <a:t>Go to 1)</a:t>
+              <a:t>Go back to 1.</a:t>
             </a:r>
           </a:p>
           <a:p>
@@ -50347,19 +50342,28 @@
             <a:endParaRPr lang="en-US" sz="2400" dirty="0"/>
           </a:p>
           <a:p>
+            <a:pPr marL="457200" indent="-457200">
+              <a:buFont typeface="+mj-lt"/>
+              <a:buAutoNum type="arabicPeriod"/>
+            </a:pPr>
+            <a:endParaRPr lang="en-US" sz="2400" dirty="0"/>
+          </a:p>
+          <a:p>
+            <a:pPr marL="457200" indent="-457200">
+              <a:buFont typeface="+mj-lt"/>
+              <a:buAutoNum type="arabicPeriod"/>
+            </a:pPr>
+            <a:endParaRPr lang="en-US" sz="2400" dirty="0"/>
+          </a:p>
+          <a:p>
+            <a:pPr marL="457200" indent="-457200">
+              <a:buFont typeface="+mj-lt"/>
+              <a:buAutoNum type="arabicPeriod"/>
+            </a:pPr>
             <a:endParaRPr lang="en-US" sz="2400" dirty="0"/>
           </a:p>
           <a:p>
             <a:endParaRPr lang="en-US" sz="2400" dirty="0"/>
-          </a:p>
-          <a:p>
-            <a:endParaRPr lang="en-US" sz="2400" dirty="0"/>
-          </a:p>
-          <a:p>
-            <a:r>
-              <a:rPr lang="en-US" sz="2400" dirty="0"/>
-              <a:t> </a:t>
-            </a:r>
           </a:p>
         </p:txBody>
       </p:sp>
@@ -50439,8 +50443,8 @@
         </p:nvSpPr>
         <p:spPr>
           <a:xfrm>
-            <a:off x="646112" y="2052919"/>
-            <a:ext cx="9403742" cy="877318"/>
+            <a:off x="646111" y="2052919"/>
+            <a:ext cx="11797680" cy="877318"/>
           </a:xfrm>
         </p:spPr>
         <p:txBody>
@@ -50451,15 +50455,15 @@
               <a:buNone/>
             </a:pPr>
             <a:r>
-              <a:rPr lang="en-US" dirty="0"/>
-              <a:t>Best strategy found after days of execution: </a:t>
+              <a:rPr lang="en-US" sz="2400" dirty="0"/>
+              <a:t>Best strategy found: </a:t>
             </a:r>
             <a:r>
-              <a:rPr lang="en-US" b="1" dirty="0"/>
+              <a:rPr lang="en-US" sz="2400" b="1" dirty="0"/>
               <a:t>4.511 </a:t>
             </a:r>
             <a:r>
-              <a:rPr lang="en-US" dirty="0"/>
+              <a:rPr lang="en-US" sz="2400" dirty="0"/>
               <a:t>guesses to win on average </a:t>
             </a:r>
           </a:p>
@@ -50486,14 +50490,14 @@
           <p:nvPr>
             <p:extLst>
               <p:ext uri="{D42A27DB-BD31-4B8C-83A1-F6EECF244321}">
-                <p14:modId xmlns:p14="http://schemas.microsoft.com/office/powerpoint/2010/main" val="1024156158"/>
+                <p14:modId xmlns:p14="http://schemas.microsoft.com/office/powerpoint/2010/main" val="2550422735"/>
               </p:ext>
             </p:extLst>
           </p:nvPr>
         </p:nvGraphicFramePr>
         <p:xfrm>
-          <a:off x="1938198" y="3351554"/>
-          <a:ext cx="8316796" cy="2612570"/>
+          <a:off x="1898442" y="2930237"/>
+          <a:ext cx="8316796" cy="3307663"/>
         </p:xfrm>
         <a:graphic>
           <a:graphicData uri="http://schemas.openxmlformats.org/drawingml/2006/chart">

</xml_diff>

<commit_message>
More changes to presentation 3
</commit_message>
<xml_diff>
--- a/ai_final_project_mastermind.pptx
+++ b/ai_final_project_mastermind.pptx
@@ -15411,7 +15411,7 @@
                   </a:defRPr>
                 </a:pPr>
                 <a:r>
-                  <a:rPr lang="en-US"/>
+                  <a:rPr lang="en-US" dirty="0"/>
                   <a:t>Iterations</a:t>
                 </a:r>
               </a:p>
@@ -15522,7 +15522,7 @@
                   </a:defRPr>
                 </a:pPr>
                 <a:r>
-                  <a:rPr lang="en-US"/>
+                  <a:rPr lang="en-US" dirty="0"/>
                   <a:t>Best Average</a:t>
                 </a:r>
               </a:p>
@@ -16734,7 +16734,7 @@
                   </a:defRPr>
                 </a:pPr>
                 <a:r>
-                  <a:rPr lang="en-US"/>
+                  <a:rPr lang="en-US" dirty="0"/>
                   <a:t>Iterations</a:t>
                 </a:r>
               </a:p>
@@ -16845,9 +16845,14 @@
                   </a:defRPr>
                 </a:pPr>
                 <a:r>
-                  <a:rPr lang="en-US"/>
-                  <a:t>Best Avarage</a:t>
+                  <a:rPr lang="en-US" dirty="0"/>
+                  <a:t>Best </a:t>
                 </a:r>
+                <a:r>
+                  <a:rPr lang="en-US" dirty="0" err="1"/>
+                  <a:t>Avarage</a:t>
+                </a:r>
+                <a:endParaRPr lang="en-US" dirty="0"/>
               </a:p>
             </c:rich>
           </c:tx>
@@ -17009,7 +17014,7 @@
               </a:defRPr>
             </a:pPr>
             <a:r>
-              <a:rPr lang="en-US" b="1" dirty="0">
+              <a:rPr lang="en-US" b="1">
                 <a:solidFill>
                   <a:schemeClr val="bg1"/>
                 </a:solidFill>
@@ -27937,7 +27942,7 @@
                   </a:defRPr>
                 </a:pPr>
                 <a:r>
-                  <a:rPr lang="en-US" b="1" dirty="0">
+                  <a:rPr lang="en-US" b="1">
                     <a:solidFill>
                       <a:schemeClr val="bg1"/>
                     </a:solidFill>
@@ -28107,7 +28112,7 @@
               </a:defRPr>
             </a:pPr>
             <a:r>
-              <a:rPr lang="en-US" b="1" dirty="0">
+              <a:rPr lang="en-US" b="1">
                 <a:solidFill>
                   <a:schemeClr val="bg1"/>
                 </a:solidFill>
@@ -28115,14 +28120,14 @@
               <a:t>Improvement over</a:t>
             </a:r>
             <a:r>
-              <a:rPr lang="en-US" b="1" baseline="0" dirty="0">
+              <a:rPr lang="en-US" b="1" baseline="0">
                 <a:solidFill>
                   <a:schemeClr val="bg1"/>
                 </a:solidFill>
               </a:rPr>
               <a:t> time</a:t>
             </a:r>
-            <a:endParaRPr lang="en-US" b="1" dirty="0">
+            <a:endParaRPr lang="en-US" b="1">
               <a:solidFill>
                 <a:schemeClr val="bg1"/>
               </a:solidFill>
@@ -32421,7 +32426,7 @@
                   </a:defRPr>
                 </a:pPr>
                 <a:r>
-                  <a:rPr lang="en-US" dirty="0">
+                  <a:rPr lang="en-US">
                     <a:solidFill>
                       <a:schemeClr val="bg1"/>
                     </a:solidFill>
@@ -32538,7 +32543,7 @@
                   </a:defRPr>
                 </a:pPr>
                 <a:r>
-                  <a:rPr lang="en-US" dirty="0">
+                  <a:rPr lang="en-US">
                     <a:solidFill>
                       <a:schemeClr val="bg1"/>
                     </a:solidFill>
@@ -35410,7 +35415,7 @@
               <a:rPr lang="en-US" smtClean="0"/>
               <a:t>2</a:t>
             </a:fld>
-            <a:endParaRPr lang="en-US"/>
+            <a:endParaRPr lang="en-US" dirty="0"/>
           </a:p>
         </p:txBody>
       </p:sp>
@@ -35471,10 +35476,67 @@
           <a:bodyPr/>
           <a:lstStyle/>
           <a:p>
+            <a:pPr marL="0" marR="0" lvl="0" indent="0" algn="l" defTabSz="914400" rtl="0" eaLnBrk="1" fontAlgn="auto" latinLnBrk="0" hangingPunct="1">
+              <a:lnSpc>
+                <a:spcPct val="100000"/>
+              </a:lnSpc>
+              <a:spcBef>
+                <a:spcPts val="0"/>
+              </a:spcBef>
+              <a:spcAft>
+                <a:spcPts val="0"/>
+              </a:spcAft>
+              <a:buClrTx/>
+              <a:buSzTx/>
+              <a:buFontTx/>
+              <a:buNone/>
+              <a:tabLst/>
+              <a:defRPr/>
+            </a:pPr>
+            <a:r>
+              <a:rPr lang="en-US" sz="1200" dirty="0"/>
+              <a:t>A guess choosing algorithm (s) employed at each turn of the game until the secret code is guessed (win condition)</a:t>
+            </a:r>
+          </a:p>
+          <a:p>
+            <a:endParaRPr lang="en-US" sz="1200" dirty="0"/>
+          </a:p>
+          <a:p>
+            <a:pPr marL="0" marR="0" lvl="0" indent="0" algn="l" defTabSz="914400" rtl="0" eaLnBrk="1" fontAlgn="auto" latinLnBrk="0" hangingPunct="1">
+              <a:lnSpc>
+                <a:spcPct val="100000"/>
+              </a:lnSpc>
+              <a:spcBef>
+                <a:spcPts val="0"/>
+              </a:spcBef>
+              <a:spcAft>
+                <a:spcPts val="0"/>
+              </a:spcAft>
+              <a:buClrTx/>
+              <a:buSzTx/>
+              <a:buFontTx/>
+              <a:buNone/>
+              <a:tabLst/>
+              <a:defRPr/>
+            </a:pPr>
+            <a:r>
+              <a:rPr lang="en-US" sz="1200" dirty="0"/>
+              <a:t>Qualifying candidates that are consistent with previous guesses and responses.</a:t>
+            </a:r>
+          </a:p>
+          <a:p>
+            <a:endParaRPr lang="en-US" sz="1200" dirty="0"/>
+          </a:p>
+          <a:p>
             <a:r>
               <a:rPr lang="en-US" sz="1200" dirty="0"/>
               <a:t>The average guesses to win is the score of the policy. The lower the better. </a:t>
             </a:r>
+          </a:p>
+          <a:p>
+            <a:endParaRPr lang="en-US" sz="1200" dirty="0"/>
+          </a:p>
+          <a:p>
             <a:endParaRPr lang="en-US" dirty="0"/>
           </a:p>
         </p:txBody>
@@ -35498,7 +35560,7 @@
               <a:rPr lang="en-US" smtClean="0"/>
               <a:t>4</a:t>
             </a:fld>
-            <a:endParaRPr lang="en-US"/>
+            <a:endParaRPr lang="en-US" dirty="0"/>
           </a:p>
         </p:txBody>
       </p:sp>
@@ -35621,7 +35683,7 @@
               <a:rPr lang="en-US" smtClean="0"/>
               <a:t>5</a:t>
             </a:fld>
-            <a:endParaRPr lang="en-US"/>
+            <a:endParaRPr lang="en-US" dirty="0"/>
           </a:p>
         </p:txBody>
       </p:sp>
@@ -35749,7 +35811,7 @@
               <a:rPr lang="en-US" smtClean="0"/>
               <a:t>7</a:t>
             </a:fld>
-            <a:endParaRPr lang="en-US"/>
+            <a:endParaRPr lang="en-US" dirty="0"/>
           </a:p>
         </p:txBody>
       </p:sp>
@@ -35856,7 +35918,7 @@
               <a:rPr lang="en-US" smtClean="0"/>
               <a:t>8</a:t>
             </a:fld>
-            <a:endParaRPr lang="en-US"/>
+            <a:endParaRPr lang="en-US" dirty="0"/>
           </a:p>
         </p:txBody>
       </p:sp>
@@ -35935,27 +35997,27 @@
               <a:defRPr/>
             </a:pPr>
             <a:r>
-              <a:rPr lang="en-US" sz="1200" dirty="0"/>
+              <a:rPr lang="en-US" sz="1200"/>
               <a:t>(typically no more than 10 guesses ) and captures high-quality information. Our NN will learn and update itself using the outcome of many games.</a:t>
             </a:r>
           </a:p>
           <a:p>
-            <a:endParaRPr lang="en-US" dirty="0"/>
+            <a:endParaRPr lang="en-US"/>
           </a:p>
           <a:p>
             <a:r>
-              <a:rPr lang="en-US" sz="1200" dirty="0"/>
+              <a:rPr lang="en-US" sz="1200"/>
               <a:t>The number of guesses to win in a game propagates back to each guess in the game</a:t>
             </a:r>
           </a:p>
           <a:p>
             <a:r>
-              <a:rPr lang="en-US" sz="1200" dirty="0"/>
+              <a:rPr lang="en-US" sz="1200"/>
               <a:t>as a score of how far the guess was from winning. A NN network will be trained based on the guess and its score that will act as label</a:t>
             </a:r>
           </a:p>
           <a:p>
-            <a:endParaRPr lang="en-US" dirty="0"/>
+            <a:endParaRPr lang="en-US"/>
           </a:p>
         </p:txBody>
       </p:sp>
@@ -35986,6 +36048,113 @@
     <p:extLst>
       <p:ext uri="{BB962C8B-B14F-4D97-AF65-F5344CB8AC3E}">
         <p14:creationId xmlns:p14="http://schemas.microsoft.com/office/powerpoint/2010/main" val="167852826"/>
+      </p:ext>
+    </p:extLst>
+  </p:cSld>
+  <p:clrMapOvr>
+    <a:masterClrMapping/>
+  </p:clrMapOvr>
+</p:notes>
+</file>
+
+<file path=ppt/notesSlides/notesSlide7.xml><?xml version="1.0" encoding="utf-8"?>
+<p:notes xmlns:a="http://schemas.openxmlformats.org/drawingml/2006/main" xmlns:r="http://schemas.openxmlformats.org/officeDocument/2006/relationships" xmlns:p="http://schemas.openxmlformats.org/presentationml/2006/main">
+  <p:cSld>
+    <p:spTree>
+      <p:nvGrpSpPr>
+        <p:cNvPr id="1" name=""/>
+        <p:cNvGrpSpPr/>
+        <p:nvPr/>
+      </p:nvGrpSpPr>
+      <p:grpSpPr>
+        <a:xfrm>
+          <a:off x="0" y="0"/>
+          <a:ext cx="0" cy="0"/>
+          <a:chOff x="0" y="0"/>
+          <a:chExt cx="0" cy="0"/>
+        </a:xfrm>
+      </p:grpSpPr>
+      <p:sp>
+        <p:nvSpPr>
+          <p:cNvPr id="2" name="Slide Image Placeholder 1"/>
+          <p:cNvSpPr>
+            <a:spLocks noGrp="1" noRot="1" noChangeAspect="1"/>
+          </p:cNvSpPr>
+          <p:nvPr>
+            <p:ph type="sldImg"/>
+          </p:nvPr>
+        </p:nvSpPr>
+        <p:spPr/>
+      </p:sp>
+      <p:sp>
+        <p:nvSpPr>
+          <p:cNvPr id="3" name="Notes Placeholder 2"/>
+          <p:cNvSpPr>
+            <a:spLocks noGrp="1"/>
+          </p:cNvSpPr>
+          <p:nvPr>
+            <p:ph type="body" idx="1"/>
+          </p:nvPr>
+        </p:nvSpPr>
+        <p:spPr/>
+        <p:txBody>
+          <a:bodyPr/>
+          <a:lstStyle/>
+          <a:p>
+            <a:pPr marL="0" marR="0" lvl="0" indent="0" algn="l" defTabSz="914400" rtl="0" eaLnBrk="1" fontAlgn="auto" latinLnBrk="0" hangingPunct="1">
+              <a:lnSpc>
+                <a:spcPct val="100000"/>
+              </a:lnSpc>
+              <a:spcBef>
+                <a:spcPts val="0"/>
+              </a:spcBef>
+              <a:spcAft>
+                <a:spcPts val="0"/>
+              </a:spcAft>
+              <a:buClrTx/>
+              <a:buSzTx/>
+              <a:buFontTx/>
+              <a:buNone/>
+              <a:tabLst/>
+              <a:defRPr/>
+            </a:pPr>
+            <a:r>
+              <a:rPr lang="en-US"/>
+              <a:t>Allowed network to learn connection between a guess and how far away it is from winning</a:t>
+            </a:r>
+          </a:p>
+          <a:p>
+            <a:endParaRPr lang="en-US"/>
+          </a:p>
+        </p:txBody>
+      </p:sp>
+      <p:sp>
+        <p:nvSpPr>
+          <p:cNvPr id="4" name="Slide Number Placeholder 3"/>
+          <p:cNvSpPr>
+            <a:spLocks noGrp="1"/>
+          </p:cNvSpPr>
+          <p:nvPr>
+            <p:ph type="sldNum" sz="quarter" idx="5"/>
+          </p:nvPr>
+        </p:nvSpPr>
+        <p:spPr/>
+        <p:txBody>
+          <a:bodyPr/>
+          <a:lstStyle/>
+          <a:p>
+            <a:fld id="{9427C16B-CC77-47B4-B653-D01F2B647ACF}" type="slidenum">
+              <a:rPr lang="en-US" smtClean="0"/>
+              <a:t>15</a:t>
+            </a:fld>
+            <a:endParaRPr lang="en-US"/>
+          </a:p>
+        </p:txBody>
+      </p:sp>
+    </p:spTree>
+    <p:extLst>
+      <p:ext uri="{BB962C8B-B14F-4D97-AF65-F5344CB8AC3E}">
+        <p14:creationId xmlns:p14="http://schemas.microsoft.com/office/powerpoint/2010/main" val="2743335074"/>
       </p:ext>
     </p:extLst>
   </p:cSld>
@@ -36368,7 +36537,6 @@
               <a:rPr lang="en-US"/>
               <a:t>Click icon to add picture</a:t>
             </a:r>
-            <a:endParaRPr lang="en-US" dirty="0"/>
           </a:p>
         </p:txBody>
       </p:sp>
@@ -37012,7 +37180,7 @@
           <a:p>
             <a:pPr lvl="0"/>
             <a:r>
-              <a:rPr lang="en-US" dirty="0"/>
+              <a:rPr lang="en-US"/>
               <a:t>“</a:t>
             </a:r>
           </a:p>
@@ -37059,7 +37227,7 @@
           <a:p>
             <a:pPr lvl="0"/>
             <a:r>
-              <a:rPr lang="en-US" dirty="0"/>
+              <a:rPr lang="en-US"/>
               <a:t>”</a:t>
             </a:r>
           </a:p>
@@ -38141,7 +38309,6 @@
               <a:rPr lang="en-US"/>
               <a:t>Click icon to add picture</a:t>
             </a:r>
-            <a:endParaRPr lang="en-US" dirty="0"/>
           </a:p>
         </p:txBody>
       </p:sp>
@@ -38361,7 +38528,6 @@
               <a:rPr lang="en-US"/>
               <a:t>Click icon to add picture</a:t>
             </a:r>
-            <a:endParaRPr lang="en-US" dirty="0"/>
           </a:p>
         </p:txBody>
       </p:sp>
@@ -38581,7 +38747,6 @@
               <a:rPr lang="en-US"/>
               <a:t>Click icon to add picture</a:t>
             </a:r>
-            <a:endParaRPr lang="en-US" dirty="0"/>
           </a:p>
         </p:txBody>
       </p:sp>
@@ -40929,7 +41094,6 @@
               <a:rPr lang="en-US"/>
               <a:t>Click icon to add picture</a:t>
             </a:r>
-            <a:endParaRPr lang="en-US" dirty="0"/>
           </a:p>
         </p:txBody>
       </p:sp>
@@ -42055,7 +42219,7 @@
           <a:lstStyle/>
           <a:p>
             <a:pPr algn="ctr"/>
-            <a:endParaRPr lang="en-US"/>
+            <a:endParaRPr lang="en-US" dirty="0"/>
           </a:p>
         </p:txBody>
       </p:sp>
@@ -42415,7 +42579,7 @@
           <a:lstStyle/>
           <a:p>
             <a:pPr algn="ctr"/>
-            <a:endParaRPr lang="en-US">
+            <a:endParaRPr lang="en-US" dirty="0">
               <a:solidFill>
                 <a:schemeClr val="tx1"/>
               </a:solidFill>
@@ -42957,7 +43121,7 @@
           <a:lstStyle/>
           <a:p>
             <a:pPr algn="ctr"/>
-            <a:endParaRPr lang="en-US"/>
+            <a:endParaRPr lang="en-US" dirty="0"/>
           </a:p>
         </p:txBody>
       </p:sp>
@@ -43501,7 +43665,7 @@
           <a:lstStyle/>
           <a:p>
             <a:r>
-              <a:rPr lang="en-US" dirty="0"/>
+              <a:rPr lang="en-US"/>
               <a:t>   </a:t>
             </a:r>
           </a:p>
@@ -43608,10 +43772,10 @@
           </a:lstStyle>
           <a:p>
             <a:r>
-              <a:rPr lang="en-US" dirty="0"/>
+              <a:rPr lang="en-US"/>
               <a:t>Temporal Difference or Monte Carlo?</a:t>
             </a:r>
-            <a:endParaRPr lang="en-US" sz="4000" dirty="0"/>
+            <a:endParaRPr lang="en-US" sz="4000"/>
           </a:p>
         </p:txBody>
       </p:sp>
@@ -43645,37 +43809,37 @@
             <a:pPr marL="342900" indent="-342900">
               <a:buAutoNum type="arabicParenR" startAt="3"/>
             </a:pPr>
-            <a:endParaRPr lang="en-US" dirty="0"/>
+            <a:endParaRPr lang="en-US"/>
           </a:p>
           <a:p>
             <a:r>
-              <a:rPr lang="en-US" dirty="0"/>
+              <a:rPr lang="en-US"/>
               <a:t>  </a:t>
             </a:r>
           </a:p>
           <a:p>
             <a:r>
-              <a:rPr lang="en-US" dirty="0"/>
+              <a:rPr lang="en-US"/>
               <a:t>   </a:t>
             </a:r>
           </a:p>
           <a:p>
-            <a:endParaRPr lang="en-US" dirty="0"/>
+            <a:endParaRPr lang="en-US"/>
           </a:p>
           <a:p>
-            <a:endParaRPr lang="en-US" dirty="0"/>
+            <a:endParaRPr lang="en-US"/>
           </a:p>
           <a:p>
-            <a:endParaRPr lang="en-US" dirty="0"/>
+            <a:endParaRPr lang="en-US"/>
           </a:p>
           <a:p>
-            <a:endParaRPr lang="en-US" dirty="0"/>
+            <a:endParaRPr lang="en-US"/>
           </a:p>
           <a:p>
-            <a:endParaRPr lang="en-US" dirty="0"/>
+            <a:endParaRPr lang="en-US"/>
           </a:p>
           <a:p>
-            <a:endParaRPr lang="en-US" dirty="0"/>
+            <a:endParaRPr lang="en-US"/>
           </a:p>
         </p:txBody>
       </p:sp>
@@ -43708,75 +43872,75 @@
           <a:lstStyle/>
           <a:p>
             <a:r>
-              <a:rPr lang="en-US" sz="2400" b="1" dirty="0"/>
+              <a:rPr lang="en-US" sz="2400" b="1"/>
               <a:t>Temporal Difference: </a:t>
             </a:r>
             <a:r>
-              <a:rPr lang="en-US" sz="2400" dirty="0"/>
+              <a:rPr lang="en-US" sz="2400"/>
               <a:t>updates model after each guess</a:t>
             </a:r>
           </a:p>
           <a:p>
-            <a:endParaRPr lang="en-US" sz="2400" dirty="0"/>
+            <a:endParaRPr lang="en-US" sz="2400"/>
           </a:p>
           <a:p>
             <a:r>
-              <a:rPr lang="en-US" sz="2400" b="1" dirty="0"/>
+              <a:rPr lang="en-US" sz="2400" b="1"/>
               <a:t>Monte Carlo</a:t>
             </a:r>
             <a:r>
-              <a:rPr lang="en-US" sz="2400" dirty="0"/>
+              <a:rPr lang="en-US" sz="2400"/>
               <a:t>: updates model after each episode</a:t>
             </a:r>
           </a:p>
           <a:p>
-            <a:endParaRPr lang="en-US" sz="2400" dirty="0"/>
+            <a:endParaRPr lang="en-US" sz="2400"/>
           </a:p>
           <a:p>
             <a:r>
-              <a:rPr lang="en-US" sz="2400" dirty="0"/>
+              <a:rPr lang="en-US" sz="2400"/>
               <a:t>Decided on </a:t>
             </a:r>
             <a:r>
-              <a:rPr lang="en-US" sz="2400" b="1" dirty="0"/>
+              <a:rPr lang="en-US" sz="2400" b="1"/>
               <a:t>Monte Carlo </a:t>
             </a:r>
             <a:r>
-              <a:rPr lang="en-US" sz="2400" dirty="0"/>
+              <a:rPr lang="en-US" sz="2400"/>
               <a:t>approach because each episode is short and captures high-quality information</a:t>
             </a:r>
           </a:p>
           <a:p>
-            <a:endParaRPr lang="en-US" sz="2400" dirty="0"/>
+            <a:endParaRPr lang="en-US" sz="2400"/>
           </a:p>
           <a:p>
             <a:r>
-              <a:rPr lang="en-US" sz="2400" dirty="0"/>
+              <a:rPr lang="en-US" sz="2400"/>
               <a:t>NN learns and updates itself using </a:t>
             </a:r>
             <a:r>
-              <a:rPr lang="en-US" sz="2400" b="1" dirty="0"/>
+              <a:rPr lang="en-US" sz="2400" b="1"/>
               <a:t>backpropagation </a:t>
             </a:r>
             <a:r>
-              <a:rPr lang="en-US" sz="2400" dirty="0"/>
+              <a:rPr lang="en-US" sz="2400"/>
               <a:t>on the outcome of many games</a:t>
             </a:r>
           </a:p>
           <a:p>
-            <a:endParaRPr lang="en-US" sz="2400" dirty="0"/>
+            <a:endParaRPr lang="en-US" sz="2400"/>
           </a:p>
           <a:p>
-            <a:endParaRPr lang="en-US" sz="2400" dirty="0"/>
+            <a:endParaRPr lang="en-US" sz="2400"/>
           </a:p>
           <a:p>
-            <a:endParaRPr lang="en-US" sz="2400" dirty="0"/>
+            <a:endParaRPr lang="en-US" sz="2400"/>
           </a:p>
           <a:p>
-            <a:endParaRPr lang="en-US" sz="2400" dirty="0"/>
+            <a:endParaRPr lang="en-US" sz="2400"/>
           </a:p>
           <a:p>
-            <a:endParaRPr lang="en-US" sz="2400" dirty="0"/>
+            <a:endParaRPr lang="en-US" sz="2400"/>
           </a:p>
         </p:txBody>
       </p:sp>
@@ -43879,7 +44043,7 @@
           <a:lstStyle/>
           <a:p>
             <a:r>
-              <a:rPr lang="en-US" dirty="0"/>
+              <a:rPr lang="en-US"/>
               <a:t>         </a:t>
             </a:r>
           </a:p>
@@ -43986,10 +44150,10 @@
           </a:lstStyle>
           <a:p>
             <a:r>
-              <a:rPr lang="en-US" dirty="0"/>
+              <a:rPr lang="en-US"/>
               <a:t>Our NN Policy</a:t>
             </a:r>
-            <a:endParaRPr lang="en-US" sz="4000" dirty="0"/>
+            <a:endParaRPr lang="en-US" sz="4000"/>
           </a:p>
         </p:txBody>
       </p:sp>
@@ -44024,7 +44188,7 @@
               <a:buAutoNum type="arabicParenR"/>
             </a:pPr>
             <a:r>
-              <a:rPr lang="en-US" sz="2400" dirty="0"/>
+              <a:rPr lang="en-US" sz="2400"/>
               <a:t>Assign score to each qualified candidate guess based on NN output </a:t>
             </a:r>
           </a:p>
@@ -44033,7 +44197,7 @@
               <a:buAutoNum type="arabicParenR"/>
             </a:pPr>
             <a:r>
-              <a:rPr lang="en-US" sz="2400" dirty="0"/>
+              <a:rPr lang="en-US" sz="2400"/>
               <a:t>Pick guess with best (lowest) score</a:t>
             </a:r>
           </a:p>
@@ -44042,13 +44206,13 @@
               <a:buAutoNum type="arabicParenR"/>
             </a:pPr>
             <a:r>
-              <a:rPr lang="en-US" sz="2400" dirty="0"/>
+              <a:rPr lang="en-US" sz="2400"/>
               <a:t>If it is a winning guess, quit  </a:t>
             </a:r>
           </a:p>
           <a:p>
             <a:r>
-              <a:rPr lang="en-US" sz="2400" dirty="0"/>
+              <a:rPr lang="en-US" sz="2400"/>
               <a:t>2) Based on the response, filters out the candidates list</a:t>
             </a:r>
           </a:p>
@@ -44057,7 +44221,7 @@
               <a:buAutoNum type="arabicParenR" startAt="3"/>
             </a:pPr>
             <a:r>
-              <a:rPr lang="en-US" sz="2400" dirty="0"/>
+              <a:rPr lang="en-US" sz="2400"/>
               <a:t>Return to step 1</a:t>
             </a:r>
           </a:p>
@@ -44065,47 +44229,47 @@
             <a:pPr marL="342900" indent="-342900">
               <a:buAutoNum type="arabicParenR" startAt="3"/>
             </a:pPr>
-            <a:endParaRPr lang="en-US" sz="2400" dirty="0"/>
+            <a:endParaRPr lang="en-US" sz="2400"/>
           </a:p>
           <a:p>
             <a:r>
-              <a:rPr lang="en-US" sz="2400" b="1" dirty="0"/>
+              <a:rPr lang="en-US" sz="2400" b="1"/>
               <a:t>Feature  extraction</a:t>
             </a:r>
             <a:r>
-              <a:rPr lang="en-US" sz="2400" dirty="0"/>
+              <a:rPr lang="en-US" sz="2400"/>
               <a:t>: Any given guess has 15 potential lists of qualifying candidates corresponding to each of the 15 possible responses. The number of elements in each list will be a feature to the NN model.  </a:t>
             </a:r>
           </a:p>
           <a:p>
             <a:r>
-              <a:rPr lang="en-US" sz="2400" dirty="0"/>
+              <a:rPr lang="en-US" sz="2400"/>
               <a:t>  </a:t>
             </a:r>
           </a:p>
           <a:p>
             <a:r>
-              <a:rPr lang="en-US" sz="2400" dirty="0"/>
+              <a:rPr lang="en-US" sz="2400"/>
               <a:t>   </a:t>
             </a:r>
           </a:p>
           <a:p>
-            <a:endParaRPr lang="en-US" sz="2400" dirty="0"/>
+            <a:endParaRPr lang="en-US" sz="2400"/>
           </a:p>
           <a:p>
-            <a:endParaRPr lang="en-US" sz="2400" dirty="0"/>
+            <a:endParaRPr lang="en-US" sz="2400"/>
           </a:p>
           <a:p>
-            <a:endParaRPr lang="en-US" sz="2400" dirty="0"/>
+            <a:endParaRPr lang="en-US" sz="2400"/>
           </a:p>
           <a:p>
-            <a:endParaRPr lang="en-US" sz="2400" dirty="0"/>
+            <a:endParaRPr lang="en-US" sz="2400"/>
           </a:p>
           <a:p>
-            <a:endParaRPr lang="en-US" sz="2400" dirty="0"/>
+            <a:endParaRPr lang="en-US" sz="2400"/>
           </a:p>
           <a:p>
-            <a:endParaRPr lang="en-US" sz="2400" dirty="0"/>
+            <a:endParaRPr lang="en-US" sz="2400"/>
           </a:p>
         </p:txBody>
       </p:sp>
@@ -44152,7 +44316,7 @@
           <a:p>
             <a:pPr algn="ctr"/>
             <a:r>
-              <a:rPr lang="en-US" dirty="0"/>
+              <a:rPr lang="en-US"/>
               <a:t>Guess candidate</a:t>
             </a:r>
           </a:p>
@@ -44248,7 +44412,7 @@
           <a:p>
             <a:pPr algn="ctr"/>
             <a:r>
-              <a:rPr lang="en-US" dirty="0"/>
+              <a:rPr lang="en-US"/>
               <a:t>Feature extraction </a:t>
             </a:r>
           </a:p>
@@ -44330,13 +44494,13 @@
           <a:lstStyle/>
           <a:p>
             <a:r>
-              <a:rPr lang="en-US" dirty="0"/>
+              <a:rPr lang="en-US"/>
               <a:t>14 </a:t>
             </a:r>
           </a:p>
           <a:p>
             <a:r>
-              <a:rPr lang="en-US" dirty="0"/>
+              <a:rPr lang="en-US"/>
               <a:t>Features</a:t>
             </a:r>
           </a:p>
@@ -44418,7 +44582,7 @@
           <a:lstStyle/>
           <a:p>
             <a:r>
-              <a:rPr lang="en-US" dirty="0"/>
+              <a:rPr lang="en-US"/>
               <a:t>NN</a:t>
             </a:r>
           </a:p>
@@ -44453,7 +44617,7 @@
           <a:lstStyle/>
           <a:p>
             <a:r>
-              <a:rPr lang="en-US" dirty="0"/>
+              <a:rPr lang="en-US"/>
               <a:t>NN output (guess score)</a:t>
             </a:r>
           </a:p>
@@ -44666,7 +44830,7 @@
           <a:lstStyle/>
           <a:p>
             <a:r>
-              <a:rPr lang="en-US" dirty="0"/>
+              <a:rPr lang="en-US"/>
               <a:t>Example</a:t>
             </a:r>
           </a:p>
@@ -44805,7 +44969,7 @@
               <a:buNone/>
             </a:pPr>
             <a:r>
-              <a:rPr lang="en-US" sz="2400" dirty="0">
+              <a:rPr lang="en-US" sz="2400">
                 <a:solidFill>
                   <a:prstClr val="white"/>
                 </a:solidFill>
@@ -44824,7 +44988,7 @@
               <a:buSzTx/>
               <a:buNone/>
             </a:pPr>
-            <a:endParaRPr lang="en-US" sz="2400" dirty="0">
+            <a:endParaRPr lang="en-US" sz="2400">
               <a:solidFill>
                 <a:prstClr val="white"/>
               </a:solidFill>
@@ -44841,7 +45005,7 @@
               <a:buSzTx/>
               <a:buNone/>
             </a:pPr>
-            <a:endParaRPr lang="en-US" sz="2400" dirty="0">
+            <a:endParaRPr lang="en-US" sz="2400">
               <a:solidFill>
                 <a:prstClr val="white"/>
               </a:solidFill>
@@ -44859,7 +45023,7 @@
               <a:buNone/>
             </a:pPr>
             <a:r>
-              <a:rPr lang="en-US" sz="2400" dirty="0">
+              <a:rPr lang="en-US" sz="2400">
                 <a:solidFill>
                   <a:prstClr val="white"/>
                 </a:solidFill>
@@ -44879,7 +45043,7 @@
               <a:buNone/>
             </a:pPr>
             <a:r>
-              <a:rPr lang="en-US" sz="2400" dirty="0">
+              <a:rPr lang="en-US" sz="2400">
                 <a:solidFill>
                   <a:prstClr val="white"/>
                 </a:solidFill>
@@ -44899,7 +45063,7 @@
               <a:buNone/>
             </a:pPr>
             <a:r>
-              <a:rPr lang="en-US" sz="2400" dirty="0">
+              <a:rPr lang="en-US" sz="2400">
                 <a:solidFill>
                   <a:prstClr val="white"/>
                 </a:solidFill>
@@ -44919,7 +45083,7 @@
               <a:buNone/>
             </a:pPr>
             <a:r>
-              <a:rPr lang="en-US" sz="2400" dirty="0">
+              <a:rPr lang="en-US" sz="2400">
                 <a:solidFill>
                   <a:prstClr val="white"/>
                 </a:solidFill>
@@ -44939,7 +45103,7 @@
               <a:buNone/>
             </a:pPr>
             <a:r>
-              <a:rPr lang="en-US" sz="2400" dirty="0">
+              <a:rPr lang="en-US" sz="2400">
                 <a:solidFill>
                   <a:prstClr val="white"/>
                 </a:solidFill>
@@ -44958,7 +45122,7 @@
               <a:buSzTx/>
               <a:buNone/>
             </a:pPr>
-            <a:endParaRPr lang="en-US" sz="2400" dirty="0">
+            <a:endParaRPr lang="en-US" sz="2400">
               <a:solidFill>
                 <a:prstClr val="white"/>
               </a:solidFill>
@@ -44976,7 +45140,7 @@
               <a:buNone/>
             </a:pPr>
             <a:r>
-              <a:rPr lang="en-US" sz="2400" dirty="0">
+              <a:rPr lang="en-US" sz="2400">
                 <a:solidFill>
                   <a:prstClr val="white"/>
                 </a:solidFill>
@@ -44996,7 +45160,7 @@
               <a:buNone/>
             </a:pPr>
             <a:r>
-              <a:rPr lang="en-US" sz="2400" dirty="0">
+              <a:rPr lang="en-US" sz="2400">
                 <a:solidFill>
                   <a:prstClr val="white"/>
                 </a:solidFill>
@@ -45010,7 +45174,7 @@
             <a:pPr marL="0" indent="0" algn="ctr">
               <a:buNone/>
             </a:pPr>
-            <a:endParaRPr lang="en-US" sz="2400" dirty="0"/>
+            <a:endParaRPr lang="en-US" sz="2400"/>
           </a:p>
         </p:txBody>
       </p:sp>
@@ -45066,7 +45230,7 @@
           <a:lstStyle/>
           <a:p>
             <a:r>
-              <a:rPr lang="en-US" dirty="0"/>
+              <a:rPr lang="en-US"/>
               <a:t>         </a:t>
             </a:r>
           </a:p>
@@ -45173,10 +45337,10 @@
           </a:lstStyle>
           <a:p>
             <a:r>
-              <a:rPr lang="en-US" dirty="0"/>
+              <a:rPr lang="en-US"/>
               <a:t>Training the NN – MCTS approach   </a:t>
             </a:r>
-            <a:endParaRPr lang="en-US" sz="4000" dirty="0"/>
+            <a:endParaRPr lang="en-US" sz="4000"/>
           </a:p>
         </p:txBody>
       </p:sp>
@@ -45207,37 +45371,37 @@
           </a:bodyPr>
           <a:lstStyle/>
           <a:p>
-            <a:endParaRPr lang="en-US" dirty="0"/>
+            <a:endParaRPr lang="en-US"/>
           </a:p>
           <a:p>
             <a:r>
-              <a:rPr lang="en-US" dirty="0"/>
+              <a:rPr lang="en-US"/>
               <a:t>  </a:t>
             </a:r>
           </a:p>
           <a:p>
             <a:r>
-              <a:rPr lang="en-US" dirty="0"/>
+              <a:rPr lang="en-US"/>
               <a:t>   </a:t>
             </a:r>
           </a:p>
           <a:p>
-            <a:endParaRPr lang="en-US" dirty="0"/>
+            <a:endParaRPr lang="en-US"/>
           </a:p>
           <a:p>
-            <a:endParaRPr lang="en-US" dirty="0"/>
+            <a:endParaRPr lang="en-US"/>
           </a:p>
           <a:p>
-            <a:endParaRPr lang="en-US" dirty="0"/>
+            <a:endParaRPr lang="en-US"/>
           </a:p>
           <a:p>
-            <a:endParaRPr lang="en-US" dirty="0"/>
+            <a:endParaRPr lang="en-US"/>
           </a:p>
           <a:p>
-            <a:endParaRPr lang="en-US" dirty="0"/>
+            <a:endParaRPr lang="en-US"/>
           </a:p>
           <a:p>
-            <a:endParaRPr lang="en-US" dirty="0"/>
+            <a:endParaRPr lang="en-US"/>
           </a:p>
         </p:txBody>
       </p:sp>
@@ -45256,7 +45420,7 @@
         <p:spPr>
           <a:xfrm>
             <a:off x="518452" y="1275879"/>
-            <a:ext cx="11015457" cy="4247317"/>
+            <a:ext cx="11444946" cy="4893647"/>
           </a:xfrm>
           <a:prstGeom prst="rect">
             <a:avLst/>
@@ -45270,51 +45434,45 @@
           <a:lstStyle/>
           <a:p>
             <a:r>
-              <a:rPr lang="en-US" dirty="0"/>
-              <a:t>Inspired by MTCS, we initially generated  game episodes using the random play strategy. </a:t>
+              <a:rPr lang="en-US" sz="2400" dirty="0"/>
+              <a:t>Initially generated game episodes using the random play strategy (inspired by MTCS)</a:t>
             </a:r>
           </a:p>
           <a:p>
+            <a:endParaRPr lang="en-US" sz="2400" dirty="0"/>
+          </a:p>
+          <a:p>
             <a:r>
-              <a:rPr lang="en-US" dirty="0"/>
-              <a:t>Each guess  in the game was converted to its features (see previous slide) while the number of guesses reminds  to the end of the episodes  (winning ) was used as a label.</a:t>
+              <a:rPr lang="en-US" sz="2400" dirty="0"/>
+              <a:t>Each guess was converted to its features and the number of guesses remaining to the winning condition was used as a label</a:t>
             </a:r>
           </a:p>
           <a:p>
-            <a:endParaRPr lang="en-US" dirty="0"/>
+            <a:endParaRPr lang="en-US" sz="2400" dirty="0"/>
           </a:p>
           <a:p>
             <a:r>
-              <a:rPr lang="en-US" dirty="0"/>
-              <a:t>That way the network could learn  the connection between a guess(represented by its features)  and how far it is from winning.</a:t>
+              <a:rPr lang="en-US" sz="2400" dirty="0"/>
+              <a:t>Gameplay output used to train the network continually after initial training</a:t>
             </a:r>
           </a:p>
           <a:p>
-            <a:endParaRPr lang="en-US" dirty="0"/>
+            <a:endParaRPr lang="en-US" sz="2400" dirty="0"/>
           </a:p>
           <a:p>
-            <a:r>
-              <a:rPr lang="en-US" dirty="0"/>
-              <a:t>After the NN was trained with initial data – we started playing games with it and its output was used as more training examples to train the network again and again.</a:t>
-            </a:r>
+            <a:endParaRPr lang="en-US" sz="2400" dirty="0"/>
           </a:p>
           <a:p>
-            <a:endParaRPr lang="en-US" dirty="0"/>
+            <a:endParaRPr lang="en-US" sz="2400" dirty="0"/>
           </a:p>
           <a:p>
-            <a:endParaRPr lang="en-US" dirty="0"/>
+            <a:endParaRPr lang="en-US" sz="2400" dirty="0"/>
           </a:p>
           <a:p>
-            <a:endParaRPr lang="en-US" dirty="0"/>
+            <a:endParaRPr lang="en-US" sz="2400" dirty="0"/>
           </a:p>
           <a:p>
-            <a:endParaRPr lang="en-US" dirty="0"/>
-          </a:p>
-          <a:p>
-            <a:endParaRPr lang="en-US" dirty="0"/>
-          </a:p>
-          <a:p>
-            <a:endParaRPr lang="en-US" dirty="0"/>
+            <a:endParaRPr lang="en-US" sz="2400" dirty="0"/>
           </a:p>
         </p:txBody>
       </p:sp>
@@ -45361,7 +45519,7 @@
           <a:p>
             <a:pPr algn="ctr"/>
             <a:r>
-              <a:rPr lang="en-US" dirty="0"/>
+              <a:rPr lang="en-US"/>
               <a:t>Episodes from Random strategy </a:t>
             </a:r>
           </a:p>
@@ -45409,7 +45567,7 @@
           <a:lstStyle/>
           <a:p>
             <a:pPr algn="ctr"/>
-            <a:endParaRPr lang="en-US" dirty="0"/>
+            <a:endParaRPr lang="en-US"/>
           </a:p>
         </p:txBody>
       </p:sp>
@@ -45442,7 +45600,7 @@
           <a:lstStyle/>
           <a:p>
             <a:r>
-              <a:rPr lang="en-US" dirty="0"/>
+              <a:rPr lang="en-US"/>
               <a:t>Training examples </a:t>
             </a:r>
           </a:p>
@@ -45539,7 +45697,7 @@
           <a:lstStyle/>
           <a:p>
             <a:pPr algn="ctr"/>
-            <a:endParaRPr lang="en-US" dirty="0"/>
+            <a:endParaRPr lang="en-US"/>
           </a:p>
         </p:txBody>
       </p:sp>
@@ -45572,7 +45730,7 @@
           <a:lstStyle/>
           <a:p>
             <a:r>
-              <a:rPr lang="en-US" dirty="0"/>
+              <a:rPr lang="en-US"/>
               <a:t>More training examples </a:t>
             </a:r>
           </a:p>
@@ -45671,14 +45829,14 @@
           <a:p>
             <a:pPr algn="ctr"/>
             <a:r>
-              <a:rPr lang="en-US" dirty="0"/>
+              <a:rPr lang="en-US"/>
               <a:t>Generate Episodes from </a:t>
             </a:r>
           </a:p>
           <a:p>
             <a:pPr algn="ctr"/>
             <a:r>
-              <a:rPr lang="en-US" dirty="0"/>
+              <a:rPr lang="en-US"/>
               <a:t>NN Strategy </a:t>
             </a:r>
           </a:p>
@@ -45726,7 +45884,7 @@
           <a:lstStyle/>
           <a:p>
             <a:pPr algn="ctr"/>
-            <a:endParaRPr lang="en-US" dirty="0"/>
+            <a:endParaRPr lang="en-US"/>
           </a:p>
         </p:txBody>
       </p:sp>
@@ -45776,7 +45934,7 @@
           <a:p>
             <a:pPr algn="ctr"/>
             <a:r>
-              <a:rPr lang="en-US" dirty="0"/>
+              <a:rPr lang="en-US"/>
               <a:t>Capture best score</a:t>
             </a:r>
           </a:p>
@@ -45834,7 +45992,7 @@
           <a:lstStyle/>
           <a:p>
             <a:r>
-              <a:rPr lang="en-US" dirty="0"/>
+              <a:rPr lang="en-US"/>
               <a:t>         </a:t>
             </a:r>
           </a:p>
@@ -45941,10 +46099,10 @@
           </a:lstStyle>
           <a:p>
             <a:r>
-              <a:rPr lang="en-US" dirty="0"/>
+              <a:rPr lang="en-US"/>
               <a:t>NN Strategy Results    </a:t>
             </a:r>
-            <a:endParaRPr lang="en-US" sz="4000" dirty="0"/>
+            <a:endParaRPr lang="en-US" sz="4000"/>
           </a:p>
         </p:txBody>
       </p:sp>
@@ -45975,37 +46133,37 @@
           </a:bodyPr>
           <a:lstStyle/>
           <a:p>
-            <a:endParaRPr lang="en-US" dirty="0"/>
+            <a:endParaRPr lang="en-US"/>
           </a:p>
           <a:p>
             <a:r>
-              <a:rPr lang="en-US" dirty="0"/>
+              <a:rPr lang="en-US"/>
               <a:t>  </a:t>
             </a:r>
           </a:p>
           <a:p>
             <a:r>
-              <a:rPr lang="en-US" dirty="0"/>
+              <a:rPr lang="en-US"/>
               <a:t>   </a:t>
             </a:r>
           </a:p>
           <a:p>
-            <a:endParaRPr lang="en-US" dirty="0"/>
+            <a:endParaRPr lang="en-US"/>
           </a:p>
           <a:p>
-            <a:endParaRPr lang="en-US" dirty="0"/>
+            <a:endParaRPr lang="en-US"/>
           </a:p>
           <a:p>
-            <a:endParaRPr lang="en-US" dirty="0"/>
+            <a:endParaRPr lang="en-US"/>
           </a:p>
           <a:p>
-            <a:endParaRPr lang="en-US" dirty="0"/>
+            <a:endParaRPr lang="en-US"/>
           </a:p>
           <a:p>
-            <a:endParaRPr lang="en-US" dirty="0"/>
+            <a:endParaRPr lang="en-US"/>
           </a:p>
           <a:p>
-            <a:endParaRPr lang="en-US" dirty="0"/>
+            <a:endParaRPr lang="en-US"/>
           </a:p>
         </p:txBody>
       </p:sp>
@@ -46069,7 +46227,7 @@
           <a:p>
             <a:pPr algn="ctr"/>
             <a:r>
-              <a:rPr lang="en-US" sz="2400" dirty="0"/>
+              <a:rPr lang="en-US" sz="2400"/>
               <a:t>Averaged 4.386 guesses to win after ~1.7k  iterations !   </a:t>
             </a:r>
           </a:p>
@@ -46128,7 +46286,7 @@
                     <a:lstStyle/>
                     <a:p>
                       <a:r>
-                        <a:rPr lang="en-US" dirty="0"/>
+                        <a:rPr lang="en-US"/>
                         <a:t>Guess to win</a:t>
                       </a:r>
                     </a:p>
@@ -46141,7 +46299,7 @@
                     <a:lstStyle/>
                     <a:p>
                       <a:r>
-                        <a:rPr lang="en-US" dirty="0"/>
+                        <a:rPr lang="en-US"/>
                         <a:t>Total  games </a:t>
                       </a:r>
                     </a:p>
@@ -46161,7 +46319,7 @@
                     <a:lstStyle/>
                     <a:p>
                       <a:r>
-                        <a:rPr lang="en-US" dirty="0"/>
+                        <a:rPr lang="en-US"/>
                         <a:t>1</a:t>
                       </a:r>
                     </a:p>
@@ -46174,7 +46332,7 @@
                     <a:lstStyle/>
                     <a:p>
                       <a:r>
-                        <a:rPr lang="en-US" dirty="0"/>
+                        <a:rPr lang="en-US"/>
                         <a:t>1</a:t>
                       </a:r>
                     </a:p>
@@ -46194,7 +46352,7 @@
                     <a:lstStyle/>
                     <a:p>
                       <a:r>
-                        <a:rPr lang="en-US" dirty="0"/>
+                        <a:rPr lang="en-US"/>
                         <a:t>2</a:t>
                       </a:r>
                     </a:p>
@@ -46207,7 +46365,7 @@
                     <a:lstStyle/>
                     <a:p>
                       <a:r>
-                        <a:rPr lang="en-US" dirty="0"/>
+                        <a:rPr lang="en-US"/>
                         <a:t>13</a:t>
                       </a:r>
                     </a:p>
@@ -46227,7 +46385,7 @@
                     <a:lstStyle/>
                     <a:p>
                       <a:r>
-                        <a:rPr lang="en-US" dirty="0"/>
+                        <a:rPr lang="en-US"/>
                         <a:t>3</a:t>
                       </a:r>
                     </a:p>
@@ -46240,7 +46398,7 @@
                     <a:lstStyle/>
                     <a:p>
                       <a:r>
-                        <a:rPr lang="en-US" dirty="0"/>
+                        <a:rPr lang="en-US"/>
                         <a:t>112</a:t>
                       </a:r>
                     </a:p>
@@ -46260,7 +46418,7 @@
                     <a:lstStyle/>
                     <a:p>
                       <a:r>
-                        <a:rPr lang="en-US" dirty="0"/>
+                        <a:rPr lang="en-US"/>
                         <a:t>4</a:t>
                       </a:r>
                     </a:p>
@@ -46273,7 +46431,7 @@
                     <a:lstStyle/>
                     <a:p>
                       <a:r>
-                        <a:rPr lang="en-US" dirty="0"/>
+                        <a:rPr lang="en-US"/>
                         <a:t>553</a:t>
                       </a:r>
                     </a:p>
@@ -46293,7 +46451,7 @@
                     <a:lstStyle/>
                     <a:p>
                       <a:r>
-                        <a:rPr lang="en-US" dirty="0"/>
+                        <a:rPr lang="en-US"/>
                         <a:t>5</a:t>
                       </a:r>
                     </a:p>
@@ -46306,7 +46464,7 @@
                     <a:lstStyle/>
                     <a:p>
                       <a:r>
-                        <a:rPr lang="en-US" dirty="0"/>
+                        <a:rPr lang="en-US"/>
                         <a:t>592</a:t>
                       </a:r>
                     </a:p>
@@ -46326,7 +46484,7 @@
                     <a:lstStyle/>
                     <a:p>
                       <a:r>
-                        <a:rPr lang="en-US" dirty="0"/>
+                        <a:rPr lang="en-US"/>
                         <a:t>6</a:t>
                       </a:r>
                     </a:p>
@@ -46339,7 +46497,7 @@
                     <a:lstStyle/>
                     <a:p>
                       <a:r>
-                        <a:rPr lang="en-US" dirty="0"/>
+                        <a:rPr lang="en-US"/>
                         <a:t>25</a:t>
                       </a:r>
                     </a:p>
@@ -46385,7 +46543,7 @@
           <a:lstStyle/>
           <a:p>
             <a:r>
-              <a:rPr lang="en-US" sz="2400" dirty="0"/>
+              <a:rPr lang="en-US" sz="2400"/>
               <a:t>Games distribution</a:t>
             </a:r>
           </a:p>
@@ -46443,7 +46601,7 @@
           <a:lstStyle/>
           <a:p>
             <a:r>
-              <a:rPr lang="en-US" dirty="0"/>
+              <a:rPr lang="en-US"/>
               <a:t>         </a:t>
             </a:r>
           </a:p>
@@ -46550,18 +46708,18 @@
           </a:lstStyle>
           <a:p>
             <a:r>
-              <a:rPr lang="en-US" dirty="0"/>
+              <a:rPr lang="en-US"/>
               <a:t>NN Results with </a:t>
             </a:r>
             <a:r>
-              <a:rPr lang="en-US" b="1" dirty="0"/>
+              <a:rPr lang="en-US" b="1"/>
               <a:t>7 </a:t>
             </a:r>
             <a:r>
-              <a:rPr lang="en-US" dirty="0"/>
+              <a:rPr lang="en-US"/>
               <a:t>colors and 4 slots   </a:t>
             </a:r>
-            <a:endParaRPr lang="en-US" sz="4000" dirty="0"/>
+            <a:endParaRPr lang="en-US" sz="4000"/>
           </a:p>
         </p:txBody>
       </p:sp>
@@ -46592,37 +46750,37 @@
           </a:bodyPr>
           <a:lstStyle/>
           <a:p>
-            <a:endParaRPr lang="en-US" dirty="0"/>
+            <a:endParaRPr lang="en-US"/>
           </a:p>
           <a:p>
             <a:r>
-              <a:rPr lang="en-US" dirty="0"/>
+              <a:rPr lang="en-US"/>
               <a:t>  </a:t>
             </a:r>
           </a:p>
           <a:p>
             <a:r>
-              <a:rPr lang="en-US" dirty="0"/>
+              <a:rPr lang="en-US"/>
               <a:t>   </a:t>
             </a:r>
           </a:p>
           <a:p>
-            <a:endParaRPr lang="en-US" dirty="0"/>
+            <a:endParaRPr lang="en-US"/>
           </a:p>
           <a:p>
-            <a:endParaRPr lang="en-US" dirty="0"/>
+            <a:endParaRPr lang="en-US"/>
           </a:p>
           <a:p>
-            <a:endParaRPr lang="en-US" dirty="0"/>
+            <a:endParaRPr lang="en-US"/>
           </a:p>
           <a:p>
-            <a:endParaRPr lang="en-US" dirty="0"/>
+            <a:endParaRPr lang="en-US"/>
           </a:p>
           <a:p>
-            <a:endParaRPr lang="en-US" dirty="0"/>
+            <a:endParaRPr lang="en-US"/>
           </a:p>
           <a:p>
-            <a:endParaRPr lang="en-US" dirty="0"/>
+            <a:endParaRPr lang="en-US"/>
           </a:p>
         </p:txBody>
       </p:sp>
@@ -46656,7 +46814,7 @@
           <a:p>
             <a:pPr algn="ctr"/>
             <a:r>
-              <a:rPr lang="en-US" sz="2400" dirty="0"/>
+              <a:rPr lang="en-US" sz="2400"/>
               <a:t>Averaged 4.775 guesses to win after ~700 iterations!   </a:t>
             </a:r>
           </a:p>
@@ -46744,7 +46902,7 @@
           <a:lstStyle/>
           <a:p>
             <a:r>
-              <a:rPr lang="en-US" dirty="0"/>
+              <a:rPr lang="en-US"/>
               <a:t>         </a:t>
             </a:r>
           </a:p>
@@ -46851,10 +47009,10 @@
           </a:lstStyle>
           <a:p>
             <a:r>
-              <a:rPr lang="en-US" dirty="0"/>
+              <a:rPr lang="en-US"/>
               <a:t>Summary </a:t>
             </a:r>
-            <a:endParaRPr lang="en-US" sz="4000" dirty="0"/>
+            <a:endParaRPr lang="en-US" sz="4000"/>
           </a:p>
         </p:txBody>
       </p:sp>
@@ -46918,7 +47076,7 @@
                     <a:lstStyle/>
                     <a:p>
                       <a:r>
-                        <a:rPr lang="en-US" dirty="0"/>
+                        <a:rPr lang="en-US"/>
                         <a:t>Policy</a:t>
                       </a:r>
                     </a:p>
@@ -46931,7 +47089,7 @@
                     <a:lstStyle/>
                     <a:p>
                       <a:r>
-                        <a:rPr lang="en-US" dirty="0"/>
+                        <a:rPr lang="en-US"/>
                         <a:t>Average # of guesses to win </a:t>
                       </a:r>
                     </a:p>
@@ -46944,7 +47102,7 @@
                     <a:lstStyle/>
                     <a:p>
                       <a:r>
-                        <a:rPr lang="en-US" dirty="0"/>
+                        <a:rPr lang="en-US"/>
                         <a:t>Worst case # of guesses to win </a:t>
                       </a:r>
                     </a:p>
@@ -46964,7 +47122,7 @@
                     <a:lstStyle/>
                     <a:p>
                       <a:r>
-                        <a:rPr lang="en-US" dirty="0"/>
+                        <a:rPr lang="en-US"/>
                         <a:t>Knuth worst case </a:t>
                       </a:r>
                     </a:p>
@@ -46977,7 +47135,7 @@
                     <a:lstStyle/>
                     <a:p>
                       <a:r>
-                        <a:rPr lang="en-US" dirty="0"/>
+                        <a:rPr lang="en-US"/>
                         <a:t>4.476</a:t>
                       </a:r>
                     </a:p>
@@ -46990,7 +47148,7 @@
                     <a:lstStyle/>
                     <a:p>
                       <a:r>
-                        <a:rPr lang="en-US" dirty="0"/>
+                        <a:rPr lang="en-US"/>
                         <a:t>5</a:t>
                       </a:r>
                     </a:p>
@@ -47010,7 +47168,7 @@
                     <a:lstStyle/>
                     <a:p>
                       <a:r>
-                        <a:rPr lang="en-US" sz="1800" b="0" i="0" u="none" strike="noStrike" kern="1200" baseline="0" dirty="0">
+                        <a:rPr lang="en-US" sz="1800" b="0" i="0" u="none" strike="noStrike" kern="1200" baseline="0">
                           <a:solidFill>
                             <a:schemeClr val="dk1"/>
                           </a:solidFill>
@@ -47020,7 +47178,7 @@
                         </a:rPr>
                         <a:t>Expected size</a:t>
                       </a:r>
-                      <a:endParaRPr lang="en-US" dirty="0"/>
+                      <a:endParaRPr lang="en-US"/>
                     </a:p>
                   </a:txBody>
                   <a:tcPr/>
@@ -47031,7 +47189,7 @@
                     <a:lstStyle/>
                     <a:p>
                       <a:r>
-                        <a:rPr lang="en-US" sz="1800" b="0" i="0" u="none" strike="noStrike" kern="1200" baseline="0" dirty="0">
+                        <a:rPr lang="en-US" sz="1800" b="0" i="0" u="none" strike="noStrike" kern="1200" baseline="0">
                           <a:solidFill>
                             <a:schemeClr val="dk1"/>
                           </a:solidFill>
@@ -47041,7 +47199,7 @@
                         </a:rPr>
                         <a:t>4.395</a:t>
                       </a:r>
-                      <a:endParaRPr lang="en-US" dirty="0"/>
+                      <a:endParaRPr lang="en-US"/>
                     </a:p>
                   </a:txBody>
                   <a:tcPr/>
@@ -47052,7 +47210,7 @@
                     <a:lstStyle/>
                     <a:p>
                       <a:r>
-                        <a:rPr lang="en-US" dirty="0"/>
+                        <a:rPr lang="en-US"/>
                         <a:t>6</a:t>
                       </a:r>
                     </a:p>
@@ -47072,7 +47230,7 @@
                     <a:lstStyle/>
                     <a:p>
                       <a:r>
-                        <a:rPr lang="en-US" dirty="0"/>
+                        <a:rPr lang="en-US"/>
                         <a:t>Entropy </a:t>
                       </a:r>
                     </a:p>
@@ -47085,7 +47243,7 @@
                     <a:lstStyle/>
                     <a:p>
                       <a:r>
-                        <a:rPr lang="en-US" sz="1800" b="0" i="0" u="none" strike="noStrike" kern="1200" baseline="0" dirty="0">
+                        <a:rPr lang="en-US" sz="1800" b="0" i="0" u="none" strike="noStrike" kern="1200" baseline="0">
                           <a:solidFill>
                             <a:schemeClr val="dk1"/>
                           </a:solidFill>
@@ -47095,7 +47253,7 @@
                         </a:rPr>
                         <a:t>4.415</a:t>
                       </a:r>
-                      <a:endParaRPr lang="en-US" dirty="0"/>
+                      <a:endParaRPr lang="en-US"/>
                     </a:p>
                   </a:txBody>
                   <a:tcPr/>
@@ -47106,7 +47264,7 @@
                     <a:lstStyle/>
                     <a:p>
                       <a:r>
-                        <a:rPr lang="en-US" dirty="0"/>
+                        <a:rPr lang="en-US"/>
                         <a:t>6</a:t>
                       </a:r>
                     </a:p>
@@ -47126,7 +47284,7 @@
                     <a:lstStyle/>
                     <a:p>
                       <a:r>
-                        <a:rPr lang="en-US" dirty="0"/>
+                        <a:rPr lang="en-US"/>
                         <a:t>Most parts </a:t>
                       </a:r>
                     </a:p>
@@ -47139,7 +47297,7 @@
                     <a:lstStyle/>
                     <a:p>
                       <a:r>
-                        <a:rPr lang="en-US" sz="1800" b="0" i="0" u="none" strike="noStrike" kern="1200" baseline="0" dirty="0">
+                        <a:rPr lang="en-US" sz="1800" b="0" i="0" u="none" strike="noStrike" kern="1200" baseline="0">
                           <a:solidFill>
                             <a:schemeClr val="dk1"/>
                           </a:solidFill>
@@ -47149,7 +47307,7 @@
                         </a:rPr>
                         <a:t>4.373</a:t>
                       </a:r>
-                      <a:endParaRPr lang="en-US" dirty="0"/>
+                      <a:endParaRPr lang="en-US"/>
                     </a:p>
                   </a:txBody>
                   <a:tcPr/>
@@ -47160,7 +47318,7 @@
                     <a:lstStyle/>
                     <a:p>
                       <a:r>
-                        <a:rPr lang="en-US" dirty="0"/>
+                        <a:rPr lang="en-US"/>
                         <a:t>6</a:t>
                       </a:r>
                     </a:p>
@@ -47180,17 +47338,17 @@
                     <a:lstStyle/>
                     <a:p>
                       <a:r>
-                        <a:rPr lang="en-US" dirty="0"/>
+                        <a:rPr lang="en-US"/>
                         <a:t>Optimal (</a:t>
                       </a:r>
                       <a:r>
-                        <a:rPr lang="en-US" dirty="0">
+                        <a:rPr lang="en-US">
                           <a:hlinkClick r:id="rId2"/>
                         </a:rPr>
                         <a:t>Koyoma and Lai</a:t>
                       </a:r>
                       <a:r>
-                        <a:rPr lang="en-US" dirty="0"/>
+                        <a:rPr lang="en-US"/>
                         <a:t>)</a:t>
                       </a:r>
                     </a:p>
@@ -47203,7 +47361,7 @@
                     <a:lstStyle/>
                     <a:p>
                       <a:r>
-                        <a:rPr lang="en-US" dirty="0"/>
+                        <a:rPr lang="en-US"/>
                         <a:t>4.340</a:t>
                       </a:r>
                     </a:p>
@@ -47216,7 +47374,7 @@
                     <a:lstStyle/>
                     <a:p>
                       <a:r>
-                        <a:rPr lang="en-US" dirty="0"/>
+                        <a:rPr lang="en-US"/>
                         <a:t>6</a:t>
                       </a:r>
                     </a:p>
@@ -47236,7 +47394,7 @@
                     <a:lstStyle/>
                     <a:p>
                       <a:r>
-                        <a:rPr lang="en-US" b="1" dirty="0">
+                        <a:rPr lang="en-US" b="1">
                           <a:solidFill>
                             <a:schemeClr val="bg1"/>
                           </a:solidFill>
@@ -47253,7 +47411,7 @@
                     <a:lstStyle/>
                     <a:p>
                       <a:r>
-                        <a:rPr lang="en-US" b="1" dirty="0">
+                        <a:rPr lang="en-US" b="1">
                           <a:solidFill>
                             <a:schemeClr val="bg1"/>
                           </a:solidFill>
@@ -47270,7 +47428,7 @@
                     <a:lstStyle/>
                     <a:p>
                       <a:r>
-                        <a:rPr lang="en-US" b="1" dirty="0">
+                        <a:rPr lang="en-US" b="1">
                           <a:solidFill>
                             <a:schemeClr val="bg1"/>
                           </a:solidFill>
@@ -47294,7 +47452,7 @@
                     <a:lstStyle/>
                     <a:p>
                       <a:r>
-                        <a:rPr lang="en-US" b="1" dirty="0">
+                        <a:rPr lang="en-US" b="1">
                           <a:solidFill>
                             <a:schemeClr val="bg1"/>
                           </a:solidFill>
@@ -47311,7 +47469,7 @@
                     <a:lstStyle/>
                     <a:p>
                       <a:r>
-                        <a:rPr lang="en-US" b="1" dirty="0">
+                        <a:rPr lang="en-US" b="1">
                           <a:solidFill>
                             <a:schemeClr val="bg1"/>
                           </a:solidFill>
@@ -47328,7 +47486,7 @@
                     <a:lstStyle/>
                     <a:p>
                       <a:r>
-                        <a:rPr lang="en-US" b="1" dirty="0">
+                        <a:rPr lang="en-US" b="1">
                           <a:solidFill>
                             <a:schemeClr val="bg1"/>
                           </a:solidFill>
@@ -47382,7 +47540,7 @@
               <a:buChar char="•"/>
             </a:pPr>
             <a:r>
-              <a:rPr lang="en-US" sz="2400" dirty="0"/>
+              <a:rPr lang="en-US" sz="2400"/>
               <a:t>NN strategy competitive with existing state of the art policies</a:t>
             </a:r>
           </a:p>
@@ -47392,7 +47550,7 @@
               <a:buChar char="•"/>
             </a:pPr>
             <a:r>
-              <a:rPr lang="en-US" sz="2400" dirty="0"/>
+              <a:rPr lang="en-US" sz="2400"/>
               <a:t>Revised Knuth policy improved average score with same worst case score</a:t>
             </a:r>
           </a:p>
@@ -47793,7 +47951,7 @@
           <a:p>
             <a:r>
               <a:rPr lang="en-US" sz="2400" dirty="0"/>
-              <a:t>Codebreaking game for two players:</a:t>
+              <a:t>Codebreaking game for two players</a:t>
             </a:r>
           </a:p>
           <a:p>
@@ -47859,9 +48017,10 @@
           </a:p>
           <a:p>
             <a:r>
-              <a:rPr lang="en-US" sz="2400" dirty="0"/>
-              <a:t>Example:</a:t>
+              <a:rPr lang="en-US" sz="2400" b="1" dirty="0"/>
+              <a:t>Example</a:t>
             </a:r>
+            <a:endParaRPr lang="en-US" sz="2400" dirty="0"/>
           </a:p>
           <a:p>
             <a:pPr marL="914400" lvl="1" indent="-457200">
@@ -48016,7 +48175,7 @@
         <p:spPr>
           <a:xfrm>
             <a:off x="388690" y="1495547"/>
-            <a:ext cx="10711701" cy="3416320"/>
+            <a:ext cx="10711701" cy="4524315"/>
           </a:xfrm>
           <a:prstGeom prst="rect">
             <a:avLst/>
@@ -48029,61 +48188,75 @@
           </a:bodyPr>
           <a:lstStyle/>
           <a:p>
-            <a:pPr marL="342900" indent="-342900">
-              <a:buFont typeface="Arial" panose="020B0604020202020204" pitchFamily="34" charset="0"/>
-              <a:buChar char="•"/>
-            </a:pPr>
             <a:r>
               <a:rPr lang="en-US" sz="2400" dirty="0"/>
-              <a:t>A Mastermind playing policy (s): a guess choosing algorithm in each turn of the game until the secret code is guessed (win condition)</a:t>
+              <a:t>A guess choosing algorithm </a:t>
+            </a:r>
+            <a:r>
+              <a:rPr lang="en-US" sz="2400" b="1" dirty="0"/>
+              <a:t>(s) </a:t>
+            </a:r>
+            <a:r>
+              <a:rPr lang="en-US" sz="2400" dirty="0"/>
+              <a:t>used on each turn of the game until winning condition is reached</a:t>
             </a:r>
           </a:p>
           <a:p>
-            <a:pPr marL="342900" indent="-342900">
-              <a:buFont typeface="Arial" panose="020B0604020202020204" pitchFamily="34" charset="0"/>
-              <a:buChar char="•"/>
-            </a:pPr>
+            <a:endParaRPr lang="en-US" sz="2400" dirty="0"/>
+          </a:p>
+          <a:p>
             <a:r>
-              <a:rPr lang="en-US" sz="2400" i="1" dirty="0"/>
+              <a:rPr lang="en-US" sz="2400" b="1" i="1" dirty="0"/>
               <a:t>s</a:t>
             </a:r>
             <a:r>
               <a:rPr lang="en-US" sz="2400" dirty="0"/>
-              <a:t> is a list of qualifying guess candidates that are consistent with previous guesses and responses </a:t>
+              <a:t> is a list of qualifying guess candidates</a:t>
             </a:r>
           </a:p>
           <a:p>
-            <a:pPr marL="342900" indent="-342900">
-              <a:buFont typeface="Arial" panose="020B0604020202020204" pitchFamily="34" charset="0"/>
-              <a:buChar char="•"/>
-            </a:pPr>
+            <a:endParaRPr lang="en-US" sz="2400" dirty="0"/>
+          </a:p>
+          <a:p>
+            <a:endParaRPr lang="en-US" sz="2400" dirty="0"/>
+          </a:p>
+          <a:p>
+            <a:r>
+              <a:rPr lang="en-US" sz="2400" b="1" dirty="0"/>
+              <a:t>Example</a:t>
+            </a:r>
+            <a:endParaRPr lang="en-US" sz="2400" dirty="0"/>
+          </a:p>
+          <a:p>
+            <a:pPr algn="ctr"/>
             <a:r>
               <a:rPr lang="en-US" sz="2400" dirty="0"/>
-              <a:t>Example: a guess of {</a:t>
+              <a:t>Guess {Red, Red, Green, Green </a:t>
             </a:r>
             <a:r>
-              <a:rPr lang="en-US" sz="2400" dirty="0" err="1"/>
-              <a:t>Red,Red,Green,Green</a:t>
+              <a:rPr lang="en-US" sz="2400" dirty="0">
+                <a:sym typeface="Wingdings" pitchFamily="2" charset="2"/>
+              </a:rPr>
+              <a:t> </a:t>
             </a:r>
             <a:r>
               <a:rPr lang="en-US" sz="2400" dirty="0"/>
-              <a:t> with a response of {0,1} we know that {</a:t>
+              <a:t> response of {0,1} </a:t>
             </a:r>
-            <a:r>
-              <a:rPr lang="en-US" sz="2400" dirty="0" err="1"/>
-              <a:t>Red,Red</a:t>
-            </a:r>
+          </a:p>
+          <a:p>
+            <a:pPr algn="ctr"/>
+            <a:endParaRPr lang="en-US" sz="2400" dirty="0"/>
+          </a:p>
+          <a:p>
+            <a:pPr algn="ctr"/>
+            <a:endParaRPr lang="en-US" sz="2400" dirty="0"/>
+          </a:p>
+          <a:p>
+            <a:pPr algn="ctr"/>
             <a:r>
               <a:rPr lang="en-US" sz="2400" dirty="0"/>
-              <a:t>, Red, Red}  is not consistent but {</a:t>
-            </a:r>
-            <a:r>
-              <a:rPr lang="en-US" sz="2400" dirty="0" err="1"/>
-              <a:t>Green,Blue,Blue,Blue</a:t>
-            </a:r>
-            <a:r>
-              <a:rPr lang="en-US" sz="2400" dirty="0"/>
-              <a:t>} is.</a:t>
+              <a:t>{Red, Red, Red, Red}  is not consistent but {Green, Blue, Blue, Blue} is</a:t>
             </a:r>
           </a:p>
           <a:p>
@@ -48202,6 +48375,47 @@
           </a:p>
         </p:txBody>
       </p:sp>
+      <p:cxnSp>
+        <p:nvCxnSpPr>
+          <p:cNvPr id="4" name="Straight Arrow Connector 3">
+            <a:extLst>
+              <a:ext uri="{FF2B5EF4-FFF2-40B4-BE49-F238E27FC236}">
+                <a16:creationId xmlns:a16="http://schemas.microsoft.com/office/drawing/2014/main" id="{6E9F7F0D-6A44-C04C-B208-FD90D244A18F}"/>
+              </a:ext>
+            </a:extLst>
+          </p:cNvPr>
+          <p:cNvCxnSpPr>
+            <a:cxnSpLocks/>
+          </p:cNvCxnSpPr>
+          <p:nvPr/>
+        </p:nvCxnSpPr>
+        <p:spPr>
+          <a:xfrm>
+            <a:off x="5665027" y="4532244"/>
+            <a:ext cx="0" cy="695739"/>
+          </a:xfrm>
+          <a:prstGeom prst="straightConnector1">
+            <a:avLst/>
+          </a:prstGeom>
+          <a:ln w="38100">
+            <a:tailEnd type="triangle"/>
+          </a:ln>
+        </p:spPr>
+        <p:style>
+          <a:lnRef idx="1">
+            <a:schemeClr val="accent1"/>
+          </a:lnRef>
+          <a:fillRef idx="0">
+            <a:schemeClr val="accent1"/>
+          </a:fillRef>
+          <a:effectRef idx="0">
+            <a:schemeClr val="accent1"/>
+          </a:effectRef>
+          <a:fontRef idx="minor">
+            <a:schemeClr val="tx1"/>
+          </a:fontRef>
+        </p:style>
+      </p:cxnSp>
     </p:spTree>
     <p:extLst>
       <p:ext uri="{BB962C8B-B14F-4D97-AF65-F5344CB8AC3E}">
@@ -48416,10 +48630,16 @@
               <a:rPr lang="en-US" sz="2400" dirty="0">
                 <a:hlinkClick r:id="rId4"/>
               </a:rPr>
-              <a:t>Koyoma and Lai, 1993  </a:t>
+              <a:t>Koyoma</a:t>
             </a:r>
             <a:r>
-              <a:rPr lang="en-US" sz="2400" dirty="0"/>
+              <a:rPr lang="en-US" sz="2400">
+                <a:hlinkClick r:id="rId4"/>
+              </a:rPr>
+              <a:t> and Lai, 1993  </a:t>
+            </a:r>
+            <a:r>
+              <a:rPr lang="en-US" sz="2400"/>
               <a:t>found an optimal strategy that wins in 6 guesses worst case and 4.34 guesses on average</a:t>
             </a:r>
           </a:p>

</xml_diff>